<commit_message>
After presentation/demo - final
</commit_message>
<xml_diff>
--- a/Unit Testing Javascript.pptx
+++ b/Unit Testing Javascript.pptx
@@ -5,28 +5,29 @@
     <p:sldMasterId id="2147483660" r:id="rId1"/>
   </p:sldMasterIdLst>
   <p:notesMasterIdLst>
-    <p:notesMasterId r:id="rId21"/>
+    <p:notesMasterId r:id="rId22"/>
   </p:notesMasterIdLst>
   <p:sldIdLst>
     <p:sldId id="256" r:id="rId2"/>
     <p:sldId id="257" r:id="rId3"/>
-    <p:sldId id="259" r:id="rId4"/>
-    <p:sldId id="258" r:id="rId5"/>
-    <p:sldId id="260" r:id="rId6"/>
-    <p:sldId id="262" r:id="rId7"/>
-    <p:sldId id="263" r:id="rId8"/>
-    <p:sldId id="261" r:id="rId9"/>
-    <p:sldId id="264" r:id="rId10"/>
-    <p:sldId id="265" r:id="rId11"/>
-    <p:sldId id="272" r:id="rId12"/>
-    <p:sldId id="273" r:id="rId13"/>
-    <p:sldId id="274" r:id="rId14"/>
-    <p:sldId id="269" r:id="rId15"/>
-    <p:sldId id="266" r:id="rId16"/>
-    <p:sldId id="267" r:id="rId17"/>
-    <p:sldId id="268" r:id="rId18"/>
-    <p:sldId id="270" r:id="rId19"/>
-    <p:sldId id="271" r:id="rId20"/>
+    <p:sldId id="275" r:id="rId4"/>
+    <p:sldId id="259" r:id="rId5"/>
+    <p:sldId id="258" r:id="rId6"/>
+    <p:sldId id="260" r:id="rId7"/>
+    <p:sldId id="262" r:id="rId8"/>
+    <p:sldId id="263" r:id="rId9"/>
+    <p:sldId id="261" r:id="rId10"/>
+    <p:sldId id="264" r:id="rId11"/>
+    <p:sldId id="265" r:id="rId12"/>
+    <p:sldId id="272" r:id="rId13"/>
+    <p:sldId id="273" r:id="rId14"/>
+    <p:sldId id="274" r:id="rId15"/>
+    <p:sldId id="269" r:id="rId16"/>
+    <p:sldId id="268" r:id="rId17"/>
+    <p:sldId id="266" r:id="rId18"/>
+    <p:sldId id="267" r:id="rId19"/>
+    <p:sldId id="270" r:id="rId20"/>
+    <p:sldId id="271" r:id="rId21"/>
   </p:sldIdLst>
   <p:sldSz cx="9144000" cy="6858000" type="screen4x3"/>
   <p:notesSz cx="6858000" cy="9144000"/>
@@ -210,7 +211,7 @@
           <a:p>
             <a:fld id="{7A63677F-0761-4F25-B656-CECF38783FB1}" type="datetimeFigureOut">
               <a:rPr lang="en-US" smtClean="0"/>
-              <a:t>5/15/2014</a:t>
+              <a:t>5/16/2014</a:t>
             </a:fld>
             <a:endParaRPr lang="en-US"/>
           </a:p>
@@ -555,7 +556,7 @@
           <a:p>
             <a:fld id="{114E9DC9-C1A0-46BF-8D43-3BCE46D67598}" type="slidenum">
               <a:rPr lang="en-US" smtClean="0"/>
-              <a:t>19</a:t>
+              <a:t>20</a:t>
             </a:fld>
             <a:endParaRPr lang="en-US"/>
           </a:p>
@@ -958,7 +959,7 @@
           <a:p>
             <a:fld id="{C8D99C1B-9DF3-4571-8DC8-4B4600C9B0A1}" type="datetimeFigureOut">
               <a:rPr lang="en-US" smtClean="0"/>
-              <a:t>5/15/2014</a:t>
+              <a:t>5/16/2014</a:t>
             </a:fld>
             <a:endParaRPr lang="en-US"/>
           </a:p>
@@ -1123,7 +1124,7 @@
           <a:p>
             <a:fld id="{C8D99C1B-9DF3-4571-8DC8-4B4600C9B0A1}" type="datetimeFigureOut">
               <a:rPr lang="en-US" smtClean="0"/>
-              <a:t>5/15/2014</a:t>
+              <a:t>5/16/2014</a:t>
             </a:fld>
             <a:endParaRPr lang="en-US"/>
           </a:p>
@@ -1298,7 +1299,7 @@
           <a:p>
             <a:fld id="{C8D99C1B-9DF3-4571-8DC8-4B4600C9B0A1}" type="datetimeFigureOut">
               <a:rPr lang="en-US" smtClean="0"/>
-              <a:t>5/15/2014</a:t>
+              <a:t>5/16/2014</a:t>
             </a:fld>
             <a:endParaRPr lang="en-US"/>
           </a:p>
@@ -1467,7 +1468,7 @@
           <a:p>
             <a:fld id="{C8D99C1B-9DF3-4571-8DC8-4B4600C9B0A1}" type="datetimeFigureOut">
               <a:rPr lang="en-US" smtClean="0"/>
-              <a:t>5/15/2014</a:t>
+              <a:t>5/16/2014</a:t>
             </a:fld>
             <a:endParaRPr lang="en-US"/>
           </a:p>
@@ -1922,7 +1923,7 @@
           <a:p>
             <a:fld id="{C8D99C1B-9DF3-4571-8DC8-4B4600C9B0A1}" type="datetimeFigureOut">
               <a:rPr lang="en-US" smtClean="0"/>
-              <a:t>5/15/2014</a:t>
+              <a:t>5/16/2014</a:t>
             </a:fld>
             <a:endParaRPr lang="en-US"/>
           </a:p>
@@ -2186,7 +2187,7 @@
           <a:p>
             <a:fld id="{C8D99C1B-9DF3-4571-8DC8-4B4600C9B0A1}" type="datetimeFigureOut">
               <a:rPr lang="en-US" smtClean="0"/>
-              <a:t>5/15/2014</a:t>
+              <a:t>5/16/2014</a:t>
             </a:fld>
             <a:endParaRPr lang="en-US"/>
           </a:p>
@@ -2560,7 +2561,7 @@
           <a:p>
             <a:fld id="{C8D99C1B-9DF3-4571-8DC8-4B4600C9B0A1}" type="datetimeFigureOut">
               <a:rPr lang="en-US" smtClean="0"/>
-              <a:t>5/15/2014</a:t>
+              <a:t>5/16/2014</a:t>
             </a:fld>
             <a:endParaRPr lang="en-US"/>
           </a:p>
@@ -2682,7 +2683,7 @@
           <a:p>
             <a:fld id="{C8D99C1B-9DF3-4571-8DC8-4B4600C9B0A1}" type="datetimeFigureOut">
               <a:rPr lang="en-US" smtClean="0"/>
-              <a:t>5/15/2014</a:t>
+              <a:t>5/16/2014</a:t>
             </a:fld>
             <a:endParaRPr lang="en-US"/>
           </a:p>
@@ -2772,7 +2773,7 @@
           <a:p>
             <a:fld id="{C8D99C1B-9DF3-4571-8DC8-4B4600C9B0A1}" type="datetimeFigureOut">
               <a:rPr lang="en-US" smtClean="0"/>
-              <a:t>5/15/2014</a:t>
+              <a:t>5/16/2014</a:t>
             </a:fld>
             <a:endParaRPr lang="en-US"/>
           </a:p>
@@ -3021,7 +3022,7 @@
           <a:p>
             <a:fld id="{C8D99C1B-9DF3-4571-8DC8-4B4600C9B0A1}" type="datetimeFigureOut">
               <a:rPr lang="en-US" smtClean="0"/>
-              <a:t>5/15/2014</a:t>
+              <a:t>5/16/2014</a:t>
             </a:fld>
             <a:endParaRPr lang="en-US"/>
           </a:p>
@@ -3280,7 +3281,7 @@
           <a:p>
             <a:fld id="{C8D99C1B-9DF3-4571-8DC8-4B4600C9B0A1}" type="datetimeFigureOut">
               <a:rPr lang="en-US" smtClean="0"/>
-              <a:t>5/15/2014</a:t>
+              <a:t>5/16/2014</a:t>
             </a:fld>
             <a:endParaRPr lang="en-US"/>
           </a:p>
@@ -3684,7 +3685,7 @@
           <a:p>
             <a:fld id="{C8D99C1B-9DF3-4571-8DC8-4B4600C9B0A1}" type="datetimeFigureOut">
               <a:rPr lang="en-US" smtClean="0"/>
-              <a:t>5/15/2014</a:t>
+              <a:t>5/16/2014</a:t>
             </a:fld>
             <a:endParaRPr lang="en-US"/>
           </a:p>
@@ -4211,6 +4212,88 @@
           </a:p>
         </p:txBody>
       </p:sp>
+      <p:sp>
+        <p:nvSpPr>
+          <p:cNvPr id="3" name="Content Placeholder 2"/>
+          <p:cNvSpPr>
+            <a:spLocks noGrp="1"/>
+          </p:cNvSpPr>
+          <p:nvPr>
+            <p:ph idx="1"/>
+          </p:nvPr>
+        </p:nvSpPr>
+        <p:spPr/>
+        <p:txBody>
+          <a:bodyPr/>
+          <a:lstStyle/>
+          <a:p>
+            <a:r>
+              <a:rPr lang="en-US" dirty="0"/>
+              <a:t>Karma is essentially a tool which spawns a web server that executes source code against test code for each of the browsers connected. The results for each test against each browser are examined and displayed via the command line to the developer such that they can see which browsers and tests passed or failed.</a:t>
+            </a:r>
+          </a:p>
+        </p:txBody>
+      </p:sp>
+    </p:spTree>
+    <p:extLst>
+      <p:ext uri="{BB962C8B-B14F-4D97-AF65-F5344CB8AC3E}">
+        <p14:creationId xmlns:p14="http://schemas.microsoft.com/office/powerpoint/2010/main" val="210717048"/>
+      </p:ext>
+    </p:extLst>
+  </p:cSld>
+  <p:clrMapOvr>
+    <a:masterClrMapping/>
+  </p:clrMapOvr>
+  <p:timing>
+    <p:tnLst>
+      <p:par>
+        <p:cTn id="1" dur="indefinite" restart="never" nodeType="tmRoot"/>
+      </p:par>
+    </p:tnLst>
+  </p:timing>
+</p:sld>
+</file>
+
+<file path=ppt/slides/slide11.xml><?xml version="1.0" encoding="utf-8"?>
+<p:sld xmlns:a="http://schemas.openxmlformats.org/drawingml/2006/main" xmlns:r="http://schemas.openxmlformats.org/officeDocument/2006/relationships" xmlns:p="http://schemas.openxmlformats.org/presentationml/2006/main">
+  <p:cSld>
+    <p:spTree>
+      <p:nvGrpSpPr>
+        <p:cNvPr id="1" name=""/>
+        <p:cNvGrpSpPr/>
+        <p:nvPr/>
+      </p:nvGrpSpPr>
+      <p:grpSpPr>
+        <a:xfrm>
+          <a:off x="0" y="0"/>
+          <a:ext cx="0" cy="0"/>
+          <a:chOff x="0" y="0"/>
+          <a:chExt cx="0" cy="0"/>
+        </a:xfrm>
+      </p:grpSpPr>
+      <p:sp>
+        <p:nvSpPr>
+          <p:cNvPr id="2" name="Title 1"/>
+          <p:cNvSpPr>
+            <a:spLocks noGrp="1"/>
+          </p:cNvSpPr>
+          <p:nvPr>
+            <p:ph type="title"/>
+          </p:nvPr>
+        </p:nvSpPr>
+        <p:spPr/>
+        <p:txBody>
+          <a:bodyPr/>
+          <a:lstStyle/>
+          <a:p>
+            <a:r>
+              <a:rPr lang="en-US" dirty="0" smtClean="0"/>
+              <a:t>Karma</a:t>
+            </a:r>
+            <a:endParaRPr lang="en-US" dirty="0"/>
+          </a:p>
+        </p:txBody>
+      </p:sp>
       <p:pic>
         <p:nvPicPr>
           <p:cNvPr id="1026" name="Picture 2"/>
@@ -4295,7 +4378,7 @@
 </p:sld>
 </file>
 
-<file path=ppt/slides/slide11.xml><?xml version="1.0" encoding="utf-8"?>
+<file path=ppt/slides/slide12.xml><?xml version="1.0" encoding="utf-8"?>
 <p:sld xmlns:a="http://schemas.openxmlformats.org/drawingml/2006/main" xmlns:r="http://schemas.openxmlformats.org/officeDocument/2006/relationships" xmlns:p="http://schemas.openxmlformats.org/presentationml/2006/main">
   <p:cSld>
     <p:spTree>
@@ -4472,7 +4555,7 @@
 </p:sld>
 </file>
 
-<file path=ppt/slides/slide12.xml><?xml version="1.0" encoding="utf-8"?>
+<file path=ppt/slides/slide13.xml><?xml version="1.0" encoding="utf-8"?>
 <p:sld xmlns:a="http://schemas.openxmlformats.org/drawingml/2006/main" xmlns:r="http://schemas.openxmlformats.org/officeDocument/2006/relationships" xmlns:p="http://schemas.openxmlformats.org/presentationml/2006/main">
   <p:cSld>
     <p:spTree>
@@ -4926,7 +5009,7 @@
 </p:sld>
 </file>
 
-<file path=ppt/slides/slide13.xml><?xml version="1.0" encoding="utf-8"?>
+<file path=ppt/slides/slide14.xml><?xml version="1.0" encoding="utf-8"?>
 <p:sld xmlns:a="http://schemas.openxmlformats.org/drawingml/2006/main" xmlns:r="http://schemas.openxmlformats.org/officeDocument/2006/relationships" xmlns:p="http://schemas.openxmlformats.org/presentationml/2006/main">
   <p:cSld>
     <p:spTree>
@@ -5069,111 +5152,6 @@
 </p:sld>
 </file>
 
-<file path=ppt/slides/slide14.xml><?xml version="1.0" encoding="utf-8"?>
-<p:sld xmlns:a="http://schemas.openxmlformats.org/drawingml/2006/main" xmlns:r="http://schemas.openxmlformats.org/officeDocument/2006/relationships" xmlns:p="http://schemas.openxmlformats.org/presentationml/2006/main">
-  <p:cSld>
-    <p:spTree>
-      <p:nvGrpSpPr>
-        <p:cNvPr id="1" name=""/>
-        <p:cNvGrpSpPr/>
-        <p:nvPr/>
-      </p:nvGrpSpPr>
-      <p:grpSpPr>
-        <a:xfrm>
-          <a:off x="0" y="0"/>
-          <a:ext cx="0" cy="0"/>
-          <a:chOff x="0" y="0"/>
-          <a:chExt cx="0" cy="0"/>
-        </a:xfrm>
-      </p:grpSpPr>
-      <p:sp>
-        <p:nvSpPr>
-          <p:cNvPr id="2" name="Title 1"/>
-          <p:cNvSpPr>
-            <a:spLocks noGrp="1"/>
-          </p:cNvSpPr>
-          <p:nvPr>
-            <p:ph type="title"/>
-          </p:nvPr>
-        </p:nvSpPr>
-        <p:spPr/>
-        <p:txBody>
-          <a:bodyPr/>
-          <a:lstStyle/>
-          <a:p>
-            <a:r>
-              <a:rPr lang="en-US" dirty="0" smtClean="0"/>
-              <a:t>Demonstration</a:t>
-            </a:r>
-            <a:endParaRPr lang="en-US" dirty="0"/>
-          </a:p>
-        </p:txBody>
-      </p:sp>
-      <p:sp>
-        <p:nvSpPr>
-          <p:cNvPr id="3" name="Content Placeholder 2"/>
-          <p:cNvSpPr>
-            <a:spLocks noGrp="1"/>
-          </p:cNvSpPr>
-          <p:nvPr>
-            <p:ph idx="1"/>
-          </p:nvPr>
-        </p:nvSpPr>
-        <p:spPr/>
-        <p:txBody>
-          <a:bodyPr/>
-          <a:lstStyle/>
-          <a:p>
-            <a:r>
-              <a:rPr lang="en-US" dirty="0"/>
-              <a:t>Adapted from </a:t>
-            </a:r>
-            <a:r>
-              <a:rPr lang="en-US" dirty="0">
-                <a:hlinkClick r:id="rId2"/>
-              </a:rPr>
-              <a:t>http://</a:t>
-            </a:r>
-            <a:r>
-              <a:rPr lang="en-US" dirty="0" smtClean="0">
-                <a:hlinkClick r:id="rId2"/>
-              </a:rPr>
-              <a:t>osintegrators.com/testing-javascript-with-karma</a:t>
-            </a:r>
-            <a:r>
-              <a:rPr lang="en-US" dirty="0" smtClean="0"/>
-              <a:t> </a:t>
-            </a:r>
-          </a:p>
-          <a:p>
-            <a:r>
-              <a:rPr lang="en-US" dirty="0" smtClean="0"/>
-              <a:t>Code available: </a:t>
-            </a:r>
-            <a:endParaRPr lang="en-US" dirty="0"/>
-          </a:p>
-        </p:txBody>
-      </p:sp>
-    </p:spTree>
-    <p:extLst>
-      <p:ext uri="{BB962C8B-B14F-4D97-AF65-F5344CB8AC3E}">
-        <p14:creationId xmlns:p14="http://schemas.microsoft.com/office/powerpoint/2010/main" val="266166528"/>
-      </p:ext>
-    </p:extLst>
-  </p:cSld>
-  <p:clrMapOvr>
-    <a:masterClrMapping/>
-  </p:clrMapOvr>
-  <p:timing>
-    <p:tnLst>
-      <p:par>
-        <p:cTn id="1" dur="indefinite" restart="never" nodeType="tmRoot"/>
-      </p:par>
-    </p:tnLst>
-  </p:timing>
-</p:sld>
-</file>
-
 <file path=ppt/slides/slide15.xml><?xml version="1.0" encoding="utf-8"?>
 <p:sld xmlns:a="http://schemas.openxmlformats.org/drawingml/2006/main" xmlns:r="http://schemas.openxmlformats.org/officeDocument/2006/relationships" xmlns:p="http://schemas.openxmlformats.org/presentationml/2006/main">
   <p:cSld>
@@ -5207,12 +5185,8 @@
           <a:lstStyle/>
           <a:p>
             <a:r>
-              <a:rPr lang="en-US" dirty="0" err="1" smtClean="0"/>
-              <a:t>RequireJS</a:t>
-            </a:r>
-            <a:r>
-              <a:rPr lang="en-US" dirty="0" smtClean="0"/>
-              <a:t> (AMD)</a:t>
+              <a:rPr lang="en-US" dirty="0" smtClean="0"/>
+              <a:t>Demonstration</a:t>
             </a:r>
             <a:endParaRPr lang="en-US" dirty="0"/>
           </a:p>
@@ -5231,268 +5205,110 @@
         <p:spPr/>
         <p:txBody>
           <a:bodyPr>
-            <a:normAutofit fontScale="77500" lnSpcReduction="20000"/>
+            <a:normAutofit lnSpcReduction="10000"/>
           </a:bodyPr>
           <a:lstStyle/>
           <a:p>
             <a:r>
-              <a:rPr lang="en-US" dirty="0" err="1" smtClean="0">
+              <a:rPr lang="en-US" dirty="0" smtClean="0"/>
+              <a:t>Code available</a:t>
+            </a:r>
+            <a:r>
+              <a:rPr lang="en-US" dirty="0" smtClean="0"/>
+              <a:t>: </a:t>
+            </a:r>
+          </a:p>
+          <a:p>
+            <a:pPr lvl="1"/>
+            <a:r>
+              <a:rPr lang="en-US" dirty="0" smtClean="0">
                 <a:hlinkClick r:id="rId2"/>
               </a:rPr>
-              <a:t>RequireJS</a:t>
-            </a:r>
-            <a:r>
-              <a:rPr lang="en-US" dirty="0" smtClean="0"/>
-              <a:t> is </a:t>
+              <a:t>https://github.com/n3f/karma-jasmine-demo</a:t>
+            </a:r>
+            <a:r>
+              <a:rPr lang="en-US" dirty="0" smtClean="0"/>
+              <a:t> </a:t>
+            </a:r>
+          </a:p>
+          <a:p>
+            <a:pPr lvl="1"/>
+            <a:r>
+              <a:rPr lang="en-US" dirty="0" smtClean="0"/>
+              <a:t>a.k.a. </a:t>
+            </a:r>
+            <a:r>
+              <a:rPr lang="en-US" dirty="0" smtClean="0">
+                <a:hlinkClick r:id="rId3"/>
+              </a:rPr>
+              <a:t>http://git.io/pie4sA</a:t>
+            </a:r>
+            <a:endParaRPr lang="en-US" dirty="0" smtClean="0"/>
+          </a:p>
+          <a:p>
+            <a:r>
+              <a:rPr lang="en-US" dirty="0" smtClean="0"/>
+              <a:t>Master branch</a:t>
+            </a:r>
+          </a:p>
+          <a:p>
+            <a:pPr lvl="1"/>
+            <a:r>
+              <a:rPr lang="en-US" dirty="0" smtClean="0"/>
+              <a:t>Adapted </a:t>
             </a:r>
             <a:r>
               <a:rPr lang="en-US" dirty="0"/>
-              <a:t>a JavaScript file and module loader. It is optimized for in-browser use, but it can be used in other JavaScript environments, like Rhino and Node. Using a modular script loader like </a:t>
-            </a:r>
-            <a:r>
-              <a:rPr lang="en-US" dirty="0" err="1"/>
-              <a:t>RequireJS</a:t>
-            </a:r>
-            <a:r>
-              <a:rPr lang="en-US" dirty="0"/>
-              <a:t> will improve the speed and quality of your code</a:t>
-            </a:r>
-            <a:r>
-              <a:rPr lang="en-US" dirty="0" smtClean="0"/>
-              <a:t>.</a:t>
-            </a:r>
-          </a:p>
-          <a:p>
-            <a:r>
-              <a:rPr lang="en-US" dirty="0" smtClean="0"/>
-              <a:t>Example:</a:t>
-            </a:r>
-          </a:p>
-          <a:p>
-            <a:pPr marL="36513" indent="420688">
-              <a:buNone/>
-            </a:pPr>
-            <a:endParaRPr lang="en-US" sz="1800" dirty="0" smtClean="0">
-              <a:latin typeface="Consolas" panose="020B0609020204030204" pitchFamily="49" charset="0"/>
-              <a:cs typeface="Consolas" panose="020B0609020204030204" pitchFamily="49" charset="0"/>
-            </a:endParaRPr>
-          </a:p>
-          <a:p>
-            <a:pPr marL="36513" indent="420688">
-              <a:buNone/>
-            </a:pPr>
-            <a:r>
-              <a:rPr lang="en-US" sz="1800" dirty="0" smtClean="0">
-                <a:latin typeface="Consolas" panose="020B0609020204030204" pitchFamily="49" charset="0"/>
-                <a:cs typeface="Consolas" panose="020B0609020204030204" pitchFamily="49" charset="0"/>
-              </a:rPr>
-              <a:t>// define a module</a:t>
-            </a:r>
-          </a:p>
-          <a:p>
-            <a:pPr marL="36513" indent="420688">
-              <a:buNone/>
-            </a:pPr>
-            <a:r>
-              <a:rPr lang="en-US" sz="1800" dirty="0">
-                <a:latin typeface="Consolas" panose="020B0609020204030204" pitchFamily="49" charset="0"/>
-                <a:cs typeface="Consolas" panose="020B0609020204030204" pitchFamily="49" charset="0"/>
-              </a:rPr>
-              <a:t>//Inside file my/shirt.js</a:t>
-            </a:r>
-            <a:r>
-              <a:rPr lang="en-US" sz="1800" dirty="0" smtClean="0">
-                <a:latin typeface="Consolas" panose="020B0609020204030204" pitchFamily="49" charset="0"/>
-                <a:cs typeface="Consolas" panose="020B0609020204030204" pitchFamily="49" charset="0"/>
-              </a:rPr>
-              <a:t>:</a:t>
-            </a:r>
-          </a:p>
-          <a:p>
-            <a:pPr marL="36513" indent="420688">
-              <a:buNone/>
-            </a:pPr>
-            <a:r>
-              <a:rPr lang="en-US" sz="1800" dirty="0" smtClean="0">
-                <a:latin typeface="Consolas" panose="020B0609020204030204" pitchFamily="49" charset="0"/>
-                <a:cs typeface="Consolas" panose="020B0609020204030204" pitchFamily="49" charset="0"/>
-              </a:rPr>
-              <a:t>define({</a:t>
-            </a:r>
-          </a:p>
-          <a:p>
-            <a:pPr marL="36513" indent="420688">
-              <a:buNone/>
-            </a:pPr>
-            <a:r>
-              <a:rPr lang="en-US" sz="1800" dirty="0">
-                <a:latin typeface="Consolas" panose="020B0609020204030204" pitchFamily="49" charset="0"/>
-                <a:cs typeface="Consolas" panose="020B0609020204030204" pitchFamily="49" charset="0"/>
-              </a:rPr>
+              <a:t>from </a:t>
+            </a:r>
+            <a:r>
+              <a:rPr lang="en-US" dirty="0">
+                <a:hlinkClick r:id="rId4"/>
+              </a:rPr>
+              <a:t>http://</a:t>
+            </a:r>
+            <a:r>
+              <a:rPr lang="en-US" dirty="0" smtClean="0">
+                <a:hlinkClick r:id="rId4"/>
+              </a:rPr>
+              <a:t>osintegrators.com/testing-javascript-with-karma</a:t>
+            </a:r>
+            <a:r>
+              <a:rPr lang="en-US" dirty="0" smtClean="0"/>
               <a:t> </a:t>
             </a:r>
-            <a:r>
-              <a:rPr lang="en-US" sz="1800" dirty="0" smtClean="0">
-                <a:latin typeface="Consolas" panose="020B0609020204030204" pitchFamily="49" charset="0"/>
-                <a:cs typeface="Consolas" panose="020B0609020204030204" pitchFamily="49" charset="0"/>
-              </a:rPr>
-              <a:t> color</a:t>
-            </a:r>
-            <a:r>
-              <a:rPr lang="en-US" sz="1800" dirty="0">
-                <a:latin typeface="Consolas" panose="020B0609020204030204" pitchFamily="49" charset="0"/>
-                <a:cs typeface="Consolas" panose="020B0609020204030204" pitchFamily="49" charset="0"/>
-              </a:rPr>
-              <a:t>: "black</a:t>
-            </a:r>
-            <a:r>
-              <a:rPr lang="en-US" sz="1800" dirty="0" smtClean="0">
-                <a:latin typeface="Consolas" panose="020B0609020204030204" pitchFamily="49" charset="0"/>
-                <a:cs typeface="Consolas" panose="020B0609020204030204" pitchFamily="49" charset="0"/>
-              </a:rPr>
-              <a:t>",</a:t>
-            </a:r>
-          </a:p>
-          <a:p>
-            <a:pPr marL="36513" indent="420688">
-              <a:buNone/>
-            </a:pPr>
-            <a:r>
-              <a:rPr lang="en-US" sz="1800" dirty="0">
-                <a:latin typeface="Consolas" panose="020B0609020204030204" pitchFamily="49" charset="0"/>
-                <a:cs typeface="Consolas" panose="020B0609020204030204" pitchFamily="49" charset="0"/>
-              </a:rPr>
-              <a:t> </a:t>
-            </a:r>
-            <a:r>
-              <a:rPr lang="en-US" sz="1800" dirty="0" smtClean="0">
-                <a:latin typeface="Consolas" panose="020B0609020204030204" pitchFamily="49" charset="0"/>
-                <a:cs typeface="Consolas" panose="020B0609020204030204" pitchFamily="49" charset="0"/>
-              </a:rPr>
-              <a:t> </a:t>
-            </a:r>
-            <a:r>
-              <a:rPr lang="en-US" sz="1800" dirty="0">
-                <a:latin typeface="Consolas" panose="020B0609020204030204" pitchFamily="49" charset="0"/>
-                <a:cs typeface="Consolas" panose="020B0609020204030204" pitchFamily="49" charset="0"/>
-              </a:rPr>
-              <a:t>size: "</a:t>
-            </a:r>
-            <a:r>
-              <a:rPr lang="en-US" sz="1800" dirty="0" err="1" smtClean="0">
-                <a:latin typeface="Consolas" panose="020B0609020204030204" pitchFamily="49" charset="0"/>
-                <a:cs typeface="Consolas" panose="020B0609020204030204" pitchFamily="49" charset="0"/>
-              </a:rPr>
-              <a:t>unisize</a:t>
-            </a:r>
-            <a:r>
-              <a:rPr lang="en-US" sz="1800" dirty="0" smtClean="0">
-                <a:latin typeface="Consolas" panose="020B0609020204030204" pitchFamily="49" charset="0"/>
-                <a:cs typeface="Consolas" panose="020B0609020204030204" pitchFamily="49" charset="0"/>
-              </a:rPr>
-              <a:t>“</a:t>
-            </a:r>
-          </a:p>
-          <a:p>
-            <a:pPr marL="36513" indent="420688">
-              <a:buNone/>
-            </a:pPr>
-            <a:r>
-              <a:rPr lang="en-US" sz="1800" dirty="0" smtClean="0">
-                <a:latin typeface="Consolas" panose="020B0609020204030204" pitchFamily="49" charset="0"/>
-                <a:cs typeface="Consolas" panose="020B0609020204030204" pitchFamily="49" charset="0"/>
-              </a:rPr>
-              <a:t>});</a:t>
-            </a:r>
-          </a:p>
-          <a:p>
-            <a:pPr marL="36513" indent="420688">
-              <a:buNone/>
-            </a:pPr>
-            <a:endParaRPr lang="en-US" sz="1800" dirty="0">
-              <a:latin typeface="Consolas" panose="020B0609020204030204" pitchFamily="49" charset="0"/>
-              <a:cs typeface="Consolas" panose="020B0609020204030204" pitchFamily="49" charset="0"/>
-            </a:endParaRPr>
-          </a:p>
-          <a:p>
-            <a:pPr marL="36513" indent="420688">
-              <a:buNone/>
-            </a:pPr>
-            <a:r>
-              <a:rPr lang="en-US" sz="1800" dirty="0" smtClean="0">
-                <a:latin typeface="Consolas" panose="020B0609020204030204" pitchFamily="49" charset="0"/>
-                <a:cs typeface="Consolas" panose="020B0609020204030204" pitchFamily="49" charset="0"/>
-              </a:rPr>
-              <a:t>// In main.js</a:t>
-            </a:r>
-          </a:p>
-          <a:p>
-            <a:pPr marL="36513" indent="420688">
-              <a:buNone/>
-            </a:pPr>
-            <a:r>
-              <a:rPr lang="en-US" sz="1800" dirty="0" smtClean="0">
-                <a:latin typeface="Consolas" panose="020B0609020204030204" pitchFamily="49" charset="0"/>
-                <a:cs typeface="Consolas" panose="020B0609020204030204" pitchFamily="49" charset="0"/>
-              </a:rPr>
-              <a:t>require([‘my/shirt.js’],function(shirt) {</a:t>
-            </a:r>
-          </a:p>
-          <a:p>
-            <a:pPr marL="36513" indent="420688">
-              <a:buNone/>
-            </a:pPr>
-            <a:r>
-              <a:rPr lang="en-US" sz="1800" dirty="0">
-                <a:latin typeface="Consolas" panose="020B0609020204030204" pitchFamily="49" charset="0"/>
-                <a:cs typeface="Consolas" panose="020B0609020204030204" pitchFamily="49" charset="0"/>
-              </a:rPr>
-              <a:t> </a:t>
-            </a:r>
-            <a:r>
-              <a:rPr lang="en-US" sz="1800" dirty="0" smtClean="0">
-                <a:latin typeface="Consolas" panose="020B0609020204030204" pitchFamily="49" charset="0"/>
-                <a:cs typeface="Consolas" panose="020B0609020204030204" pitchFamily="49" charset="0"/>
-              </a:rPr>
-              <a:t> alert(</a:t>
-            </a:r>
-            <a:r>
-              <a:rPr lang="en-US" sz="1800" dirty="0" err="1" smtClean="0">
-                <a:latin typeface="Consolas" panose="020B0609020204030204" pitchFamily="49" charset="0"/>
-                <a:cs typeface="Consolas" panose="020B0609020204030204" pitchFamily="49" charset="0"/>
-              </a:rPr>
-              <a:t>shirt.color</a:t>
-            </a:r>
-            <a:r>
-              <a:rPr lang="en-US" sz="1800" dirty="0" smtClean="0">
-                <a:latin typeface="Consolas" panose="020B0609020204030204" pitchFamily="49" charset="0"/>
-                <a:cs typeface="Consolas" panose="020B0609020204030204" pitchFamily="49" charset="0"/>
-              </a:rPr>
-              <a:t>); // black</a:t>
-            </a:r>
-          </a:p>
-          <a:p>
-            <a:pPr marL="36513" indent="420688">
-              <a:buNone/>
-            </a:pPr>
-            <a:r>
-              <a:rPr lang="en-US" sz="1800" dirty="0" smtClean="0">
-                <a:latin typeface="Consolas" panose="020B0609020204030204" pitchFamily="49" charset="0"/>
-                <a:cs typeface="Consolas" panose="020B0609020204030204" pitchFamily="49" charset="0"/>
-              </a:rPr>
-              <a:t>});</a:t>
-            </a:r>
-            <a:endParaRPr lang="en-US" sz="1800" dirty="0">
-              <a:latin typeface="Consolas" panose="020B0609020204030204" pitchFamily="49" charset="0"/>
-              <a:cs typeface="Consolas" panose="020B0609020204030204" pitchFamily="49" charset="0"/>
-            </a:endParaRPr>
+            <a:endParaRPr lang="en-US" dirty="0" smtClean="0"/>
+          </a:p>
+          <a:p>
+            <a:pPr lvl="1"/>
+            <a:r>
+              <a:rPr lang="en-US" dirty="0" smtClean="0"/>
+              <a:t>Backbone based web application structure</a:t>
+            </a:r>
+          </a:p>
+          <a:p>
+            <a:r>
+              <a:rPr lang="en-US" dirty="0" smtClean="0"/>
+              <a:t>Jest branch</a:t>
+            </a:r>
+          </a:p>
+          <a:p>
+            <a:pPr lvl="1"/>
+            <a:r>
+              <a:rPr lang="en-US" dirty="0" smtClean="0"/>
+              <a:t>From the jest documentation</a:t>
+            </a:r>
+            <a:endParaRPr lang="en-US" dirty="0" smtClean="0"/>
+          </a:p>
+          <a:p>
+            <a:endParaRPr lang="en-US" dirty="0"/>
           </a:p>
         </p:txBody>
       </p:sp>
     </p:spTree>
     <p:extLst>
       <p:ext uri="{BB962C8B-B14F-4D97-AF65-F5344CB8AC3E}">
-        <p14:creationId xmlns:p14="http://schemas.microsoft.com/office/powerpoint/2010/main" val="4101921567"/>
+        <p14:creationId xmlns:p14="http://schemas.microsoft.com/office/powerpoint/2010/main" val="266166528"/>
       </p:ext>
     </p:extLst>
   </p:cSld>
@@ -5543,255 +5359,77 @@
           <a:p>
             <a:r>
               <a:rPr lang="en-US" dirty="0" err="1" smtClean="0"/>
-              <a:t>Browserify</a:t>
-            </a:r>
-            <a:r>
-              <a:rPr lang="en-US" dirty="0" smtClean="0"/>
-              <a:t> (</a:t>
-            </a:r>
+              <a:t>Javascript</a:t>
+            </a:r>
+            <a:r>
+              <a:rPr lang="en-US" dirty="0" smtClean="0"/>
+              <a:t> Loaders</a:t>
+            </a:r>
+            <a:endParaRPr lang="en-US" dirty="0"/>
+          </a:p>
+        </p:txBody>
+      </p:sp>
+      <p:sp>
+        <p:nvSpPr>
+          <p:cNvPr id="3" name="Content Placeholder 2"/>
+          <p:cNvSpPr>
+            <a:spLocks noGrp="1"/>
+          </p:cNvSpPr>
+          <p:nvPr>
+            <p:ph idx="1"/>
+          </p:nvPr>
+        </p:nvSpPr>
+        <p:spPr>
+          <a:xfrm>
+            <a:off x="457200" y="1600200"/>
+            <a:ext cx="7696200" cy="4525963"/>
+          </a:xfrm>
+        </p:spPr>
+        <p:txBody>
+          <a:bodyPr/>
+          <a:lstStyle/>
+          <a:p>
+            <a:r>
+              <a:rPr lang="en-US" dirty="0" err="1" smtClean="0"/>
+              <a:t>RequireJS</a:t>
+            </a:r>
+            <a:r>
+              <a:rPr lang="en-US" dirty="0"/>
+              <a:t> </a:t>
+            </a:r>
+            <a:r>
+              <a:rPr lang="en-US" dirty="0" smtClean="0"/>
+              <a:t>(AMD)</a:t>
+            </a:r>
+          </a:p>
+          <a:p>
             <a:r>
               <a:rPr lang="en-US" dirty="0" err="1" smtClean="0"/>
               <a:t>CommonJS</a:t>
             </a:r>
-            <a:r>
-              <a:rPr lang="en-US" dirty="0" smtClean="0"/>
-              <a:t>)</a:t>
-            </a:r>
-            <a:endParaRPr lang="en-US" dirty="0"/>
-          </a:p>
-        </p:txBody>
-      </p:sp>
-      <p:sp>
-        <p:nvSpPr>
-          <p:cNvPr id="3" name="Content Placeholder 2"/>
-          <p:cNvSpPr>
-            <a:spLocks noGrp="1"/>
-          </p:cNvSpPr>
-          <p:nvPr>
-            <p:ph idx="1"/>
-          </p:nvPr>
-        </p:nvSpPr>
-        <p:spPr/>
-        <p:txBody>
-          <a:bodyPr>
-            <a:normAutofit fontScale="77500" lnSpcReduction="20000"/>
-          </a:bodyPr>
-          <a:lstStyle/>
-          <a:p>
-            <a:r>
-              <a:rPr lang="en-US" dirty="0"/>
-              <a:t>Browsers don't have the require method defined, but Node.js does. With </a:t>
-            </a:r>
-            <a:r>
-              <a:rPr lang="en-US" dirty="0" err="1">
+          </a:p>
+          <a:p>
+            <a:r>
+              <a:rPr lang="en-US" dirty="0" smtClean="0"/>
+              <a:t>For more information</a:t>
+            </a:r>
+          </a:p>
+          <a:p>
+            <a:pPr lvl="1"/>
+            <a:r>
+              <a:rPr lang="en-US" dirty="0" smtClean="0">
                 <a:hlinkClick r:id="rId2"/>
               </a:rPr>
-              <a:t>Browserify</a:t>
-            </a:r>
-            <a:r>
-              <a:rPr lang="en-US" dirty="0"/>
-              <a:t> you can write code that uses require in the same way that you would use it in Node</a:t>
-            </a:r>
-            <a:r>
-              <a:rPr lang="en-US" dirty="0" smtClean="0"/>
-              <a:t>.</a:t>
-            </a:r>
-          </a:p>
-          <a:p>
-            <a:r>
-              <a:rPr lang="en-US" dirty="0" smtClean="0"/>
-              <a:t>Example:</a:t>
-            </a:r>
-          </a:p>
-          <a:p>
-            <a:pPr marL="36513" indent="420688">
-              <a:buNone/>
-            </a:pPr>
-            <a:endParaRPr lang="en-US" sz="1800" dirty="0" smtClean="0">
-              <a:latin typeface="Consolas" panose="020B0609020204030204" pitchFamily="49" charset="0"/>
-              <a:cs typeface="Consolas" panose="020B0609020204030204" pitchFamily="49" charset="0"/>
-            </a:endParaRPr>
-          </a:p>
-          <a:p>
-            <a:pPr marL="36513" indent="420688">
-              <a:buNone/>
-            </a:pPr>
-            <a:r>
-              <a:rPr lang="en-US" sz="1800" dirty="0" smtClean="0">
-                <a:latin typeface="Consolas" panose="020B0609020204030204" pitchFamily="49" charset="0"/>
-                <a:cs typeface="Consolas" panose="020B0609020204030204" pitchFamily="49" charset="0"/>
-              </a:rPr>
-              <a:t>// Create a module like any node module. (e.g. hi.js)</a:t>
-            </a:r>
-          </a:p>
-          <a:p>
-            <a:pPr marL="36513" indent="420688">
-              <a:buNone/>
-            </a:pPr>
-            <a:r>
-              <a:rPr lang="en-US" sz="1800" dirty="0" err="1" smtClean="0">
-                <a:latin typeface="Consolas" panose="020B0609020204030204" pitchFamily="49" charset="0"/>
-                <a:cs typeface="Consolas" panose="020B0609020204030204" pitchFamily="49" charset="0"/>
-              </a:rPr>
-              <a:t>module.exports</a:t>
-            </a:r>
-            <a:r>
-              <a:rPr lang="en-US" sz="1800" dirty="0" smtClean="0">
-                <a:latin typeface="Consolas" panose="020B0609020204030204" pitchFamily="49" charset="0"/>
-                <a:cs typeface="Consolas" panose="020B0609020204030204" pitchFamily="49" charset="0"/>
-              </a:rPr>
-              <a:t> = function() {</a:t>
-            </a:r>
-          </a:p>
-          <a:p>
-            <a:pPr marL="36513" indent="420688">
-              <a:buNone/>
-            </a:pPr>
-            <a:r>
-              <a:rPr lang="en-US" sz="1800" dirty="0">
-                <a:latin typeface="Consolas" panose="020B0609020204030204" pitchFamily="49" charset="0"/>
-                <a:cs typeface="Consolas" panose="020B0609020204030204" pitchFamily="49" charset="0"/>
-              </a:rPr>
-              <a:t> </a:t>
-            </a:r>
-            <a:r>
-              <a:rPr lang="en-US" sz="1800" dirty="0" smtClean="0">
-                <a:latin typeface="Consolas" panose="020B0609020204030204" pitchFamily="49" charset="0"/>
-                <a:cs typeface="Consolas" panose="020B0609020204030204" pitchFamily="49" charset="0"/>
-              </a:rPr>
-              <a:t> return “Hello World!”;</a:t>
-            </a:r>
-          </a:p>
-          <a:p>
-            <a:pPr marL="36513" indent="420688">
-              <a:buNone/>
-            </a:pPr>
-            <a:r>
-              <a:rPr lang="en-US" sz="1800" dirty="0" smtClean="0">
-                <a:latin typeface="Consolas" panose="020B0609020204030204" pitchFamily="49" charset="0"/>
-                <a:cs typeface="Consolas" panose="020B0609020204030204" pitchFamily="49" charset="0"/>
-              </a:rPr>
-              <a:t>}</a:t>
-            </a:r>
-          </a:p>
-          <a:p>
-            <a:pPr marL="36513" indent="420688">
-              <a:buNone/>
-            </a:pPr>
-            <a:endParaRPr lang="en-US" sz="1800" dirty="0">
-              <a:latin typeface="Consolas" panose="020B0609020204030204" pitchFamily="49" charset="0"/>
-              <a:cs typeface="Consolas" panose="020B0609020204030204" pitchFamily="49" charset="0"/>
-            </a:endParaRPr>
-          </a:p>
-          <a:p>
-            <a:pPr marL="36513" indent="420688">
-              <a:buNone/>
-            </a:pPr>
-            <a:r>
-              <a:rPr lang="en-US" sz="1800" dirty="0" smtClean="0">
-                <a:latin typeface="Consolas" panose="020B0609020204030204" pitchFamily="49" charset="0"/>
-                <a:cs typeface="Consolas" panose="020B0609020204030204" pitchFamily="49" charset="0"/>
-              </a:rPr>
-              <a:t>// in main.js</a:t>
-            </a:r>
-          </a:p>
-          <a:p>
-            <a:pPr marL="36513" indent="420688">
-              <a:buNone/>
-            </a:pPr>
-            <a:r>
-              <a:rPr lang="en-US" sz="1800" dirty="0" err="1" smtClean="0">
-                <a:latin typeface="Consolas" panose="020B0609020204030204" pitchFamily="49" charset="0"/>
-                <a:cs typeface="Consolas" panose="020B0609020204030204" pitchFamily="49" charset="0"/>
-              </a:rPr>
-              <a:t>var</a:t>
-            </a:r>
-            <a:r>
-              <a:rPr lang="en-US" sz="1800" dirty="0" smtClean="0">
-                <a:latin typeface="Consolas" panose="020B0609020204030204" pitchFamily="49" charset="0"/>
-                <a:cs typeface="Consolas" panose="020B0609020204030204" pitchFamily="49" charset="0"/>
-              </a:rPr>
-              <a:t> hello = require(‘hi.js’);</a:t>
-            </a:r>
-          </a:p>
-          <a:p>
-            <a:pPr marL="36513" indent="420688">
-              <a:buNone/>
-            </a:pPr>
-            <a:r>
-              <a:rPr lang="en-US" sz="1800" dirty="0" smtClean="0">
-                <a:latin typeface="Consolas" panose="020B0609020204030204" pitchFamily="49" charset="0"/>
-                <a:cs typeface="Consolas" panose="020B0609020204030204" pitchFamily="49" charset="0"/>
-              </a:rPr>
-              <a:t>alert(hello()) // returns “Hello World!”</a:t>
-            </a:r>
-          </a:p>
-          <a:p>
-            <a:pPr marL="36513" indent="420688">
-              <a:buNone/>
-            </a:pPr>
-            <a:endParaRPr lang="en-US" sz="1800" dirty="0" smtClean="0">
-              <a:latin typeface="Consolas" panose="020B0609020204030204" pitchFamily="49" charset="0"/>
-              <a:cs typeface="Consolas" panose="020B0609020204030204" pitchFamily="49" charset="0"/>
-            </a:endParaRPr>
-          </a:p>
-          <a:p>
-            <a:r>
-              <a:rPr lang="en-US" dirty="0" err="1" smtClean="0"/>
-              <a:t>Browserify</a:t>
-            </a:r>
-            <a:r>
-              <a:rPr lang="en-US" dirty="0" smtClean="0"/>
-              <a:t> will create one </a:t>
-            </a:r>
-            <a:r>
-              <a:rPr lang="en-US" dirty="0" err="1" smtClean="0"/>
-              <a:t>js</a:t>
-            </a:r>
-            <a:r>
-              <a:rPr lang="en-US" dirty="0" smtClean="0"/>
-              <a:t> file for you</a:t>
-            </a:r>
-          </a:p>
-          <a:p>
-            <a:pPr lvl="1"/>
-            <a:r>
-              <a:rPr lang="en-US" sz="2100" dirty="0" err="1" smtClean="0">
-                <a:latin typeface="Consolas" panose="020B0609020204030204" pitchFamily="49" charset="0"/>
-                <a:cs typeface="Consolas" panose="020B0609020204030204" pitchFamily="49" charset="0"/>
-              </a:rPr>
-              <a:t>browserify</a:t>
-            </a:r>
-            <a:r>
-              <a:rPr lang="en-US" sz="2100" dirty="0" smtClean="0">
-                <a:latin typeface="Consolas" panose="020B0609020204030204" pitchFamily="49" charset="0"/>
-                <a:cs typeface="Consolas" panose="020B0609020204030204" pitchFamily="49" charset="0"/>
-              </a:rPr>
-              <a:t> </a:t>
-            </a:r>
-            <a:r>
-              <a:rPr lang="en-US" sz="2100" dirty="0">
-                <a:latin typeface="Consolas" panose="020B0609020204030204" pitchFamily="49" charset="0"/>
-                <a:cs typeface="Consolas" panose="020B0609020204030204" pitchFamily="49" charset="0"/>
-              </a:rPr>
-              <a:t>main.js –o bundle.js</a:t>
-            </a:r>
-          </a:p>
-          <a:p>
-            <a:pPr marL="36513" indent="420688">
-              <a:buNone/>
-            </a:pPr>
-            <a:endParaRPr lang="en-US" dirty="0">
-              <a:latin typeface="Consolas" panose="020B0609020204030204" pitchFamily="49" charset="0"/>
-              <a:cs typeface="Consolas" panose="020B0609020204030204" pitchFamily="49" charset="0"/>
-            </a:endParaRPr>
+              <a:t>http://addyosmani.com/writing-modular-js/</a:t>
+            </a:r>
+            <a:endParaRPr lang="en-US" dirty="0" smtClean="0"/>
           </a:p>
         </p:txBody>
       </p:sp>
     </p:spTree>
     <p:extLst>
       <p:ext uri="{BB962C8B-B14F-4D97-AF65-F5344CB8AC3E}">
-        <p14:creationId xmlns:p14="http://schemas.microsoft.com/office/powerpoint/2010/main" val="3140160138"/>
+        <p14:creationId xmlns:p14="http://schemas.microsoft.com/office/powerpoint/2010/main" val="4591955"/>
       </p:ext>
     </p:extLst>
   </p:cSld>
@@ -5842,11 +5480,11 @@
           <a:p>
             <a:r>
               <a:rPr lang="en-US" dirty="0" err="1" smtClean="0"/>
-              <a:t>Javascript</a:t>
-            </a:r>
-            <a:r>
-              <a:rPr lang="en-US" dirty="0" smtClean="0"/>
-              <a:t> Loaders</a:t>
+              <a:t>RequireJS</a:t>
+            </a:r>
+            <a:r>
+              <a:rPr lang="en-US" dirty="0" smtClean="0"/>
+              <a:t> (AMD)</a:t>
             </a:r>
             <a:endParaRPr lang="en-US" dirty="0"/>
           </a:p>
@@ -5862,36 +5500,271 @@
             <p:ph idx="1"/>
           </p:nvPr>
         </p:nvSpPr>
-        <p:spPr>
-          <a:xfrm>
-            <a:off x="457200" y="1600200"/>
-            <a:ext cx="7696200" cy="4525963"/>
-          </a:xfrm>
-        </p:spPr>
-        <p:txBody>
-          <a:bodyPr/>
-          <a:lstStyle/>
-          <a:p>
-            <a:r>
-              <a:rPr lang="en-US" dirty="0" smtClean="0"/>
-              <a:t>For more information</a:t>
-            </a:r>
-          </a:p>
-          <a:p>
-            <a:r>
-              <a:rPr lang="en-US" dirty="0">
+        <p:spPr/>
+        <p:txBody>
+          <a:bodyPr>
+            <a:normAutofit fontScale="77500" lnSpcReduction="20000"/>
+          </a:bodyPr>
+          <a:lstStyle/>
+          <a:p>
+            <a:r>
+              <a:rPr lang="en-US" dirty="0" err="1" smtClean="0">
                 <a:hlinkClick r:id="rId2"/>
               </a:rPr>
-              <a:t>http://addyosmani.com/writing-modular-js/</a:t>
-            </a:r>
-            <a:endParaRPr lang="en-US" dirty="0"/>
+              <a:t>RequireJS</a:t>
+            </a:r>
+            <a:r>
+              <a:rPr lang="en-US" dirty="0" smtClean="0"/>
+              <a:t> is </a:t>
+            </a:r>
+            <a:r>
+              <a:rPr lang="en-US" dirty="0"/>
+              <a:t>a JavaScript file and module loader. It is optimized for in-browser use, but it can be used in other JavaScript environments, like Rhino and Node. Using a modular script loader like </a:t>
+            </a:r>
+            <a:r>
+              <a:rPr lang="en-US" dirty="0" err="1"/>
+              <a:t>RequireJS</a:t>
+            </a:r>
+            <a:r>
+              <a:rPr lang="en-US" dirty="0"/>
+              <a:t> will improve the speed and quality of your code</a:t>
+            </a:r>
+            <a:r>
+              <a:rPr lang="en-US" dirty="0" smtClean="0"/>
+              <a:t>.</a:t>
+            </a:r>
+          </a:p>
+          <a:p>
+            <a:r>
+              <a:rPr lang="en-US" dirty="0" smtClean="0"/>
+              <a:t>Example:</a:t>
+            </a:r>
+          </a:p>
+          <a:p>
+            <a:pPr marL="36513" indent="420688">
+              <a:buNone/>
+            </a:pPr>
+            <a:endParaRPr lang="en-US" sz="1800" dirty="0" smtClean="0">
+              <a:latin typeface="Consolas" panose="020B0609020204030204" pitchFamily="49" charset="0"/>
+              <a:cs typeface="Consolas" panose="020B0609020204030204" pitchFamily="49" charset="0"/>
+            </a:endParaRPr>
+          </a:p>
+          <a:p>
+            <a:pPr marL="36513" indent="420688">
+              <a:buNone/>
+            </a:pPr>
+            <a:r>
+              <a:rPr lang="en-US" sz="1800" dirty="0" smtClean="0">
+                <a:latin typeface="Consolas" panose="020B0609020204030204" pitchFamily="49" charset="0"/>
+                <a:cs typeface="Consolas" panose="020B0609020204030204" pitchFamily="49" charset="0"/>
+              </a:rPr>
+              <a:t>// define a module</a:t>
+            </a:r>
+          </a:p>
+          <a:p>
+            <a:pPr marL="36513" indent="420688">
+              <a:buNone/>
+            </a:pPr>
+            <a:r>
+              <a:rPr lang="en-US" sz="1800" dirty="0">
+                <a:latin typeface="Consolas" panose="020B0609020204030204" pitchFamily="49" charset="0"/>
+                <a:cs typeface="Consolas" panose="020B0609020204030204" pitchFamily="49" charset="0"/>
+              </a:rPr>
+              <a:t>//Inside file my/shirt.js</a:t>
+            </a:r>
+            <a:r>
+              <a:rPr lang="en-US" sz="1800" dirty="0" smtClean="0">
+                <a:latin typeface="Consolas" panose="020B0609020204030204" pitchFamily="49" charset="0"/>
+                <a:cs typeface="Consolas" panose="020B0609020204030204" pitchFamily="49" charset="0"/>
+              </a:rPr>
+              <a:t>:</a:t>
+            </a:r>
+          </a:p>
+          <a:p>
+            <a:pPr marL="36513" indent="420688">
+              <a:buNone/>
+            </a:pPr>
+            <a:r>
+              <a:rPr lang="en-US" sz="1800" dirty="0" smtClean="0">
+                <a:latin typeface="Consolas" panose="020B0609020204030204" pitchFamily="49" charset="0"/>
+                <a:cs typeface="Consolas" panose="020B0609020204030204" pitchFamily="49" charset="0"/>
+              </a:rPr>
+              <a:t>define({</a:t>
+            </a:r>
+          </a:p>
+          <a:p>
+            <a:pPr marL="36513" indent="420688">
+              <a:buNone/>
+            </a:pPr>
+            <a:r>
+              <a:rPr lang="en-US" sz="1800" dirty="0">
+                <a:latin typeface="Consolas" panose="020B0609020204030204" pitchFamily="49" charset="0"/>
+                <a:cs typeface="Consolas" panose="020B0609020204030204" pitchFamily="49" charset="0"/>
+              </a:rPr>
+              <a:t> </a:t>
+            </a:r>
+            <a:r>
+              <a:rPr lang="en-US" sz="1800" dirty="0" smtClean="0">
+                <a:latin typeface="Consolas" panose="020B0609020204030204" pitchFamily="49" charset="0"/>
+                <a:cs typeface="Consolas" panose="020B0609020204030204" pitchFamily="49" charset="0"/>
+              </a:rPr>
+              <a:t> color</a:t>
+            </a:r>
+            <a:r>
+              <a:rPr lang="en-US" sz="1800" dirty="0">
+                <a:latin typeface="Consolas" panose="020B0609020204030204" pitchFamily="49" charset="0"/>
+                <a:cs typeface="Consolas" panose="020B0609020204030204" pitchFamily="49" charset="0"/>
+              </a:rPr>
+              <a:t>: "black</a:t>
+            </a:r>
+            <a:r>
+              <a:rPr lang="en-US" sz="1800" dirty="0" smtClean="0">
+                <a:latin typeface="Consolas" panose="020B0609020204030204" pitchFamily="49" charset="0"/>
+                <a:cs typeface="Consolas" panose="020B0609020204030204" pitchFamily="49" charset="0"/>
+              </a:rPr>
+              <a:t>",</a:t>
+            </a:r>
+          </a:p>
+          <a:p>
+            <a:pPr marL="36513" indent="420688">
+              <a:buNone/>
+            </a:pPr>
+            <a:r>
+              <a:rPr lang="en-US" sz="1800" dirty="0">
+                <a:latin typeface="Consolas" panose="020B0609020204030204" pitchFamily="49" charset="0"/>
+                <a:cs typeface="Consolas" panose="020B0609020204030204" pitchFamily="49" charset="0"/>
+              </a:rPr>
+              <a:t> </a:t>
+            </a:r>
+            <a:r>
+              <a:rPr lang="en-US" sz="1800" dirty="0" smtClean="0">
+                <a:latin typeface="Consolas" panose="020B0609020204030204" pitchFamily="49" charset="0"/>
+                <a:cs typeface="Consolas" panose="020B0609020204030204" pitchFamily="49" charset="0"/>
+              </a:rPr>
+              <a:t> </a:t>
+            </a:r>
+            <a:r>
+              <a:rPr lang="en-US" sz="1800" dirty="0">
+                <a:latin typeface="Consolas" panose="020B0609020204030204" pitchFamily="49" charset="0"/>
+                <a:cs typeface="Consolas" panose="020B0609020204030204" pitchFamily="49" charset="0"/>
+              </a:rPr>
+              <a:t>size: "</a:t>
+            </a:r>
+            <a:r>
+              <a:rPr lang="en-US" sz="1800" dirty="0" err="1" smtClean="0">
+                <a:latin typeface="Consolas" panose="020B0609020204030204" pitchFamily="49" charset="0"/>
+                <a:cs typeface="Consolas" panose="020B0609020204030204" pitchFamily="49" charset="0"/>
+              </a:rPr>
+              <a:t>unisize</a:t>
+            </a:r>
+            <a:r>
+              <a:rPr lang="en-US" sz="1800" dirty="0" smtClean="0">
+                <a:latin typeface="Consolas" panose="020B0609020204030204" pitchFamily="49" charset="0"/>
+                <a:cs typeface="Consolas" panose="020B0609020204030204" pitchFamily="49" charset="0"/>
+              </a:rPr>
+              <a:t>“</a:t>
+            </a:r>
+          </a:p>
+          <a:p>
+            <a:pPr marL="36513" indent="420688">
+              <a:buNone/>
+            </a:pPr>
+            <a:r>
+              <a:rPr lang="en-US" sz="1800" dirty="0" smtClean="0">
+                <a:latin typeface="Consolas" panose="020B0609020204030204" pitchFamily="49" charset="0"/>
+                <a:cs typeface="Consolas" panose="020B0609020204030204" pitchFamily="49" charset="0"/>
+              </a:rPr>
+              <a:t>});</a:t>
+            </a:r>
+          </a:p>
+          <a:p>
+            <a:pPr marL="36513" indent="420688">
+              <a:buNone/>
+            </a:pPr>
+            <a:endParaRPr lang="en-US" sz="1800" dirty="0">
+              <a:latin typeface="Consolas" panose="020B0609020204030204" pitchFamily="49" charset="0"/>
+              <a:cs typeface="Consolas" panose="020B0609020204030204" pitchFamily="49" charset="0"/>
+            </a:endParaRPr>
+          </a:p>
+          <a:p>
+            <a:pPr marL="36513" indent="420688">
+              <a:buNone/>
+            </a:pPr>
+            <a:r>
+              <a:rPr lang="en-US" sz="1800" dirty="0" smtClean="0">
+                <a:latin typeface="Consolas" panose="020B0609020204030204" pitchFamily="49" charset="0"/>
+                <a:cs typeface="Consolas" panose="020B0609020204030204" pitchFamily="49" charset="0"/>
+              </a:rPr>
+              <a:t>// In main.js</a:t>
+            </a:r>
+          </a:p>
+          <a:p>
+            <a:pPr marL="36513" indent="420688">
+              <a:buNone/>
+            </a:pPr>
+            <a:r>
+              <a:rPr lang="en-US" sz="1800" dirty="0" smtClean="0">
+                <a:latin typeface="Consolas" panose="020B0609020204030204" pitchFamily="49" charset="0"/>
+                <a:cs typeface="Consolas" panose="020B0609020204030204" pitchFamily="49" charset="0"/>
+              </a:rPr>
+              <a:t>require([‘my/shirt.js’],function(shirt) {</a:t>
+            </a:r>
+          </a:p>
+          <a:p>
+            <a:pPr marL="36513" indent="420688">
+              <a:buNone/>
+            </a:pPr>
+            <a:r>
+              <a:rPr lang="en-US" sz="1800" dirty="0">
+                <a:latin typeface="Consolas" panose="020B0609020204030204" pitchFamily="49" charset="0"/>
+                <a:cs typeface="Consolas" panose="020B0609020204030204" pitchFamily="49" charset="0"/>
+              </a:rPr>
+              <a:t> </a:t>
+            </a:r>
+            <a:r>
+              <a:rPr lang="en-US" sz="1800" dirty="0" smtClean="0">
+                <a:latin typeface="Consolas" panose="020B0609020204030204" pitchFamily="49" charset="0"/>
+                <a:cs typeface="Consolas" panose="020B0609020204030204" pitchFamily="49" charset="0"/>
+              </a:rPr>
+              <a:t> alert(</a:t>
+            </a:r>
+            <a:r>
+              <a:rPr lang="en-US" sz="1800" dirty="0" err="1" smtClean="0">
+                <a:latin typeface="Consolas" panose="020B0609020204030204" pitchFamily="49" charset="0"/>
+                <a:cs typeface="Consolas" panose="020B0609020204030204" pitchFamily="49" charset="0"/>
+              </a:rPr>
+              <a:t>shirt.color</a:t>
+            </a:r>
+            <a:r>
+              <a:rPr lang="en-US" sz="1800" dirty="0" smtClean="0">
+                <a:latin typeface="Consolas" panose="020B0609020204030204" pitchFamily="49" charset="0"/>
+                <a:cs typeface="Consolas" panose="020B0609020204030204" pitchFamily="49" charset="0"/>
+              </a:rPr>
+              <a:t>); // black</a:t>
+            </a:r>
+          </a:p>
+          <a:p>
+            <a:pPr marL="36513" indent="420688">
+              <a:buNone/>
+            </a:pPr>
+            <a:r>
+              <a:rPr lang="en-US" sz="1800" dirty="0" smtClean="0">
+                <a:latin typeface="Consolas" panose="020B0609020204030204" pitchFamily="49" charset="0"/>
+                <a:cs typeface="Consolas" panose="020B0609020204030204" pitchFamily="49" charset="0"/>
+              </a:rPr>
+              <a:t>});</a:t>
+            </a:r>
+            <a:endParaRPr lang="en-US" sz="1800" dirty="0">
+              <a:latin typeface="Consolas" panose="020B0609020204030204" pitchFamily="49" charset="0"/>
+              <a:cs typeface="Consolas" panose="020B0609020204030204" pitchFamily="49" charset="0"/>
+            </a:endParaRPr>
           </a:p>
         </p:txBody>
       </p:sp>
     </p:spTree>
     <p:extLst>
       <p:ext uri="{BB962C8B-B14F-4D97-AF65-F5344CB8AC3E}">
-        <p14:creationId xmlns:p14="http://schemas.microsoft.com/office/powerpoint/2010/main" val="4591955"/>
+        <p14:creationId xmlns:p14="http://schemas.microsoft.com/office/powerpoint/2010/main" val="4101921567"/>
       </p:ext>
     </p:extLst>
   </p:cSld>
@@ -5909,6 +5782,305 @@
 </file>
 
 <file path=ppt/slides/slide18.xml><?xml version="1.0" encoding="utf-8"?>
+<p:sld xmlns:a="http://schemas.openxmlformats.org/drawingml/2006/main" xmlns:r="http://schemas.openxmlformats.org/officeDocument/2006/relationships" xmlns:p="http://schemas.openxmlformats.org/presentationml/2006/main">
+  <p:cSld>
+    <p:spTree>
+      <p:nvGrpSpPr>
+        <p:cNvPr id="1" name=""/>
+        <p:cNvGrpSpPr/>
+        <p:nvPr/>
+      </p:nvGrpSpPr>
+      <p:grpSpPr>
+        <a:xfrm>
+          <a:off x="0" y="0"/>
+          <a:ext cx="0" cy="0"/>
+          <a:chOff x="0" y="0"/>
+          <a:chExt cx="0" cy="0"/>
+        </a:xfrm>
+      </p:grpSpPr>
+      <p:sp>
+        <p:nvSpPr>
+          <p:cNvPr id="2" name="Title 1"/>
+          <p:cNvSpPr>
+            <a:spLocks noGrp="1"/>
+          </p:cNvSpPr>
+          <p:nvPr>
+            <p:ph type="title"/>
+          </p:nvPr>
+        </p:nvSpPr>
+        <p:spPr/>
+        <p:txBody>
+          <a:bodyPr/>
+          <a:lstStyle/>
+          <a:p>
+            <a:r>
+              <a:rPr lang="en-US" dirty="0" err="1" smtClean="0"/>
+              <a:t>Browserify</a:t>
+            </a:r>
+            <a:r>
+              <a:rPr lang="en-US" dirty="0" smtClean="0"/>
+              <a:t> (</a:t>
+            </a:r>
+            <a:r>
+              <a:rPr lang="en-US" dirty="0" err="1" smtClean="0"/>
+              <a:t>CommonJS</a:t>
+            </a:r>
+            <a:r>
+              <a:rPr lang="en-US" dirty="0" smtClean="0"/>
+              <a:t>)</a:t>
+            </a:r>
+            <a:endParaRPr lang="en-US" dirty="0"/>
+          </a:p>
+        </p:txBody>
+      </p:sp>
+      <p:sp>
+        <p:nvSpPr>
+          <p:cNvPr id="3" name="Content Placeholder 2"/>
+          <p:cNvSpPr>
+            <a:spLocks noGrp="1"/>
+          </p:cNvSpPr>
+          <p:nvPr>
+            <p:ph idx="1"/>
+          </p:nvPr>
+        </p:nvSpPr>
+        <p:spPr/>
+        <p:txBody>
+          <a:bodyPr>
+            <a:normAutofit fontScale="77500" lnSpcReduction="20000"/>
+          </a:bodyPr>
+          <a:lstStyle/>
+          <a:p>
+            <a:r>
+              <a:rPr lang="en-US" dirty="0"/>
+              <a:t>Browsers don't have the require method defined, but Node.js does. With </a:t>
+            </a:r>
+            <a:r>
+              <a:rPr lang="en-US" dirty="0" err="1">
+                <a:hlinkClick r:id="rId2"/>
+              </a:rPr>
+              <a:t>Browserify</a:t>
+            </a:r>
+            <a:r>
+              <a:rPr lang="en-US" dirty="0"/>
+              <a:t> you can write code that uses require in the same way that you would use it in Node</a:t>
+            </a:r>
+            <a:r>
+              <a:rPr lang="en-US" dirty="0" smtClean="0"/>
+              <a:t>.</a:t>
+            </a:r>
+          </a:p>
+          <a:p>
+            <a:r>
+              <a:rPr lang="en-US" dirty="0" smtClean="0"/>
+              <a:t>Example:</a:t>
+            </a:r>
+          </a:p>
+          <a:p>
+            <a:pPr marL="36513" indent="420688">
+              <a:buNone/>
+            </a:pPr>
+            <a:endParaRPr lang="en-US" sz="1800" dirty="0" smtClean="0">
+              <a:latin typeface="Consolas" panose="020B0609020204030204" pitchFamily="49" charset="0"/>
+              <a:cs typeface="Consolas" panose="020B0609020204030204" pitchFamily="49" charset="0"/>
+            </a:endParaRPr>
+          </a:p>
+          <a:p>
+            <a:pPr marL="36513" indent="420688">
+              <a:buNone/>
+            </a:pPr>
+            <a:r>
+              <a:rPr lang="en-US" sz="1800" dirty="0" smtClean="0">
+                <a:latin typeface="Consolas" panose="020B0609020204030204" pitchFamily="49" charset="0"/>
+                <a:cs typeface="Consolas" panose="020B0609020204030204" pitchFamily="49" charset="0"/>
+              </a:rPr>
+              <a:t>// Create a module like any node module. (e.g. hi.js)</a:t>
+            </a:r>
+          </a:p>
+          <a:p>
+            <a:pPr marL="36513" indent="420688">
+              <a:buNone/>
+            </a:pPr>
+            <a:r>
+              <a:rPr lang="en-US" sz="1800" dirty="0" err="1" smtClean="0">
+                <a:latin typeface="Consolas" panose="020B0609020204030204" pitchFamily="49" charset="0"/>
+                <a:cs typeface="Consolas" panose="020B0609020204030204" pitchFamily="49" charset="0"/>
+              </a:rPr>
+              <a:t>module.exports</a:t>
+            </a:r>
+            <a:r>
+              <a:rPr lang="en-US" sz="1800" dirty="0" smtClean="0">
+                <a:latin typeface="Consolas" panose="020B0609020204030204" pitchFamily="49" charset="0"/>
+                <a:cs typeface="Consolas" panose="020B0609020204030204" pitchFamily="49" charset="0"/>
+              </a:rPr>
+              <a:t> = function() {</a:t>
+            </a:r>
+          </a:p>
+          <a:p>
+            <a:pPr marL="36513" indent="420688">
+              <a:buNone/>
+            </a:pPr>
+            <a:r>
+              <a:rPr lang="en-US" sz="1800" dirty="0">
+                <a:latin typeface="Consolas" panose="020B0609020204030204" pitchFamily="49" charset="0"/>
+                <a:cs typeface="Consolas" panose="020B0609020204030204" pitchFamily="49" charset="0"/>
+              </a:rPr>
+              <a:t> </a:t>
+            </a:r>
+            <a:r>
+              <a:rPr lang="en-US" sz="1800" dirty="0" smtClean="0">
+                <a:latin typeface="Consolas" panose="020B0609020204030204" pitchFamily="49" charset="0"/>
+                <a:cs typeface="Consolas" panose="020B0609020204030204" pitchFamily="49" charset="0"/>
+              </a:rPr>
+              <a:t> return “Hello World!”;</a:t>
+            </a:r>
+          </a:p>
+          <a:p>
+            <a:pPr marL="36513" indent="420688">
+              <a:buNone/>
+            </a:pPr>
+            <a:r>
+              <a:rPr lang="en-US" sz="1800" dirty="0" smtClean="0">
+                <a:latin typeface="Consolas" panose="020B0609020204030204" pitchFamily="49" charset="0"/>
+                <a:cs typeface="Consolas" panose="020B0609020204030204" pitchFamily="49" charset="0"/>
+              </a:rPr>
+              <a:t>}</a:t>
+            </a:r>
+          </a:p>
+          <a:p>
+            <a:pPr marL="36513" indent="420688">
+              <a:buNone/>
+            </a:pPr>
+            <a:endParaRPr lang="en-US" sz="1800" dirty="0">
+              <a:latin typeface="Consolas" panose="020B0609020204030204" pitchFamily="49" charset="0"/>
+              <a:cs typeface="Consolas" panose="020B0609020204030204" pitchFamily="49" charset="0"/>
+            </a:endParaRPr>
+          </a:p>
+          <a:p>
+            <a:pPr marL="36513" indent="420688">
+              <a:buNone/>
+            </a:pPr>
+            <a:r>
+              <a:rPr lang="en-US" sz="1800" dirty="0" smtClean="0">
+                <a:latin typeface="Consolas" panose="020B0609020204030204" pitchFamily="49" charset="0"/>
+                <a:cs typeface="Consolas" panose="020B0609020204030204" pitchFamily="49" charset="0"/>
+              </a:rPr>
+              <a:t>// in main.js</a:t>
+            </a:r>
+          </a:p>
+          <a:p>
+            <a:pPr marL="36513" indent="420688">
+              <a:buNone/>
+            </a:pPr>
+            <a:r>
+              <a:rPr lang="en-US" sz="1800" dirty="0" err="1" smtClean="0">
+                <a:latin typeface="Consolas" panose="020B0609020204030204" pitchFamily="49" charset="0"/>
+                <a:cs typeface="Consolas" panose="020B0609020204030204" pitchFamily="49" charset="0"/>
+              </a:rPr>
+              <a:t>var</a:t>
+            </a:r>
+            <a:r>
+              <a:rPr lang="en-US" sz="1800" dirty="0" smtClean="0">
+                <a:latin typeface="Consolas" panose="020B0609020204030204" pitchFamily="49" charset="0"/>
+                <a:cs typeface="Consolas" panose="020B0609020204030204" pitchFamily="49" charset="0"/>
+              </a:rPr>
+              <a:t> hello = require(‘hi.js’);</a:t>
+            </a:r>
+          </a:p>
+          <a:p>
+            <a:pPr marL="36513" indent="420688">
+              <a:buNone/>
+            </a:pPr>
+            <a:r>
+              <a:rPr lang="en-US" sz="1800" dirty="0" smtClean="0">
+                <a:latin typeface="Consolas" panose="020B0609020204030204" pitchFamily="49" charset="0"/>
+                <a:cs typeface="Consolas" panose="020B0609020204030204" pitchFamily="49" charset="0"/>
+              </a:rPr>
+              <a:t>alert(hello()) // returns “Hello World!”</a:t>
+            </a:r>
+          </a:p>
+          <a:p>
+            <a:pPr marL="36513" indent="420688">
+              <a:buNone/>
+            </a:pPr>
+            <a:endParaRPr lang="en-US" sz="1800" dirty="0" smtClean="0">
+              <a:latin typeface="Consolas" panose="020B0609020204030204" pitchFamily="49" charset="0"/>
+              <a:cs typeface="Consolas" panose="020B0609020204030204" pitchFamily="49" charset="0"/>
+            </a:endParaRPr>
+          </a:p>
+          <a:p>
+            <a:r>
+              <a:rPr lang="en-US" dirty="0" err="1" smtClean="0"/>
+              <a:t>Browserify</a:t>
+            </a:r>
+            <a:r>
+              <a:rPr lang="en-US" dirty="0" smtClean="0"/>
+              <a:t> will create one </a:t>
+            </a:r>
+            <a:r>
+              <a:rPr lang="en-US" dirty="0" err="1" smtClean="0"/>
+              <a:t>js</a:t>
+            </a:r>
+            <a:r>
+              <a:rPr lang="en-US" dirty="0" smtClean="0"/>
+              <a:t> file for you</a:t>
+            </a:r>
+          </a:p>
+          <a:p>
+            <a:pPr lvl="1"/>
+            <a:r>
+              <a:rPr lang="en-US" sz="2100" dirty="0" err="1" smtClean="0">
+                <a:latin typeface="Consolas" panose="020B0609020204030204" pitchFamily="49" charset="0"/>
+                <a:cs typeface="Consolas" panose="020B0609020204030204" pitchFamily="49" charset="0"/>
+              </a:rPr>
+              <a:t>browserify</a:t>
+            </a:r>
+            <a:r>
+              <a:rPr lang="en-US" sz="2100" dirty="0" smtClean="0">
+                <a:latin typeface="Consolas" panose="020B0609020204030204" pitchFamily="49" charset="0"/>
+                <a:cs typeface="Consolas" panose="020B0609020204030204" pitchFamily="49" charset="0"/>
+              </a:rPr>
+              <a:t> </a:t>
+            </a:r>
+            <a:r>
+              <a:rPr lang="en-US" sz="2100" dirty="0">
+                <a:latin typeface="Consolas" panose="020B0609020204030204" pitchFamily="49" charset="0"/>
+                <a:cs typeface="Consolas" panose="020B0609020204030204" pitchFamily="49" charset="0"/>
+              </a:rPr>
+              <a:t>main.js –o bundle.js</a:t>
+            </a:r>
+          </a:p>
+          <a:p>
+            <a:pPr marL="36513" indent="420688">
+              <a:buNone/>
+            </a:pPr>
+            <a:endParaRPr lang="en-US" dirty="0">
+              <a:latin typeface="Consolas" panose="020B0609020204030204" pitchFamily="49" charset="0"/>
+              <a:cs typeface="Consolas" panose="020B0609020204030204" pitchFamily="49" charset="0"/>
+            </a:endParaRPr>
+          </a:p>
+        </p:txBody>
+      </p:sp>
+    </p:spTree>
+    <p:extLst>
+      <p:ext uri="{BB962C8B-B14F-4D97-AF65-F5344CB8AC3E}">
+        <p14:creationId xmlns:p14="http://schemas.microsoft.com/office/powerpoint/2010/main" val="3140160138"/>
+      </p:ext>
+    </p:extLst>
+  </p:cSld>
+  <p:clrMapOvr>
+    <a:masterClrMapping/>
+  </p:clrMapOvr>
+  <p:timing>
+    <p:tnLst>
+      <p:par>
+        <p:cTn id="1" dur="indefinite" restart="never" nodeType="tmRoot"/>
+      </p:par>
+    </p:tnLst>
+  </p:timing>
+</p:sld>
+</file>
+
+<file path=ppt/slides/slide19.xml><?xml version="1.0" encoding="utf-8"?>
 <p:sld xmlns:a="http://schemas.openxmlformats.org/drawingml/2006/main" xmlns:r="http://schemas.openxmlformats.org/officeDocument/2006/relationships" xmlns:p="http://schemas.openxmlformats.org/presentationml/2006/main">
   <p:cSld>
     <p:spTree>
@@ -6028,7 +6200,175 @@
 </p:sld>
 </file>
 
-<file path=ppt/slides/slide19.xml><?xml version="1.0" encoding="utf-8"?>
+<file path=ppt/slides/slide2.xml><?xml version="1.0" encoding="utf-8"?>
+<p:sld xmlns:a="http://schemas.openxmlformats.org/drawingml/2006/main" xmlns:r="http://schemas.openxmlformats.org/officeDocument/2006/relationships" xmlns:p="http://schemas.openxmlformats.org/presentationml/2006/main">
+  <p:cSld>
+    <p:spTree>
+      <p:nvGrpSpPr>
+        <p:cNvPr id="1" name=""/>
+        <p:cNvGrpSpPr/>
+        <p:nvPr/>
+      </p:nvGrpSpPr>
+      <p:grpSpPr>
+        <a:xfrm>
+          <a:off x="0" y="0"/>
+          <a:ext cx="0" cy="0"/>
+          <a:chOff x="0" y="0"/>
+          <a:chExt cx="0" cy="0"/>
+        </a:xfrm>
+      </p:grpSpPr>
+      <p:sp>
+        <p:nvSpPr>
+          <p:cNvPr id="2" name="Title 1"/>
+          <p:cNvSpPr>
+            <a:spLocks noGrp="1"/>
+          </p:cNvSpPr>
+          <p:nvPr>
+            <p:ph type="title"/>
+          </p:nvPr>
+        </p:nvSpPr>
+        <p:spPr/>
+        <p:txBody>
+          <a:bodyPr/>
+          <a:lstStyle/>
+          <a:p>
+            <a:r>
+              <a:rPr lang="en-US" dirty="0" smtClean="0"/>
+              <a:t>Agenda</a:t>
+            </a:r>
+            <a:endParaRPr lang="en-US" dirty="0"/>
+          </a:p>
+        </p:txBody>
+      </p:sp>
+      <p:sp>
+        <p:nvSpPr>
+          <p:cNvPr id="3" name="Content Placeholder 2"/>
+          <p:cNvSpPr>
+            <a:spLocks noGrp="1"/>
+          </p:cNvSpPr>
+          <p:nvPr>
+            <p:ph idx="1"/>
+          </p:nvPr>
+        </p:nvSpPr>
+        <p:spPr/>
+        <p:txBody>
+          <a:bodyPr>
+            <a:normAutofit fontScale="92500" lnSpcReduction="20000"/>
+          </a:bodyPr>
+          <a:lstStyle/>
+          <a:p>
+            <a:r>
+              <a:rPr lang="en-US" dirty="0" smtClean="0"/>
+              <a:t>Introduction</a:t>
+            </a:r>
+          </a:p>
+          <a:p>
+            <a:r>
+              <a:rPr lang="en-US" dirty="0" smtClean="0"/>
+              <a:t>Tools</a:t>
+            </a:r>
+          </a:p>
+          <a:p>
+            <a:pPr lvl="1"/>
+            <a:r>
+              <a:rPr lang="en-US" dirty="0" smtClean="0"/>
+              <a:t>Jasmine</a:t>
+            </a:r>
+          </a:p>
+          <a:p>
+            <a:pPr lvl="1"/>
+            <a:r>
+              <a:rPr lang="en-US" dirty="0" smtClean="0"/>
+              <a:t>Karma</a:t>
+            </a:r>
+          </a:p>
+          <a:p>
+            <a:pPr lvl="1"/>
+            <a:r>
+              <a:rPr lang="en-US" dirty="0" smtClean="0"/>
+              <a:t>Jest</a:t>
+            </a:r>
+          </a:p>
+          <a:p>
+            <a:r>
+              <a:rPr lang="en-US" dirty="0" smtClean="0"/>
+              <a:t>Demonstration</a:t>
+            </a:r>
+            <a:endParaRPr lang="en-US" dirty="0" smtClean="0"/>
+          </a:p>
+          <a:p>
+            <a:r>
+              <a:rPr lang="en-US" dirty="0" smtClean="0"/>
+              <a:t>More Tools</a:t>
+            </a:r>
+          </a:p>
+          <a:p>
+            <a:pPr lvl="1"/>
+            <a:r>
+              <a:rPr lang="en-US" dirty="0" smtClean="0"/>
+              <a:t>Package Management: Node/NPM</a:t>
+            </a:r>
+          </a:p>
+          <a:p>
+            <a:pPr lvl="1"/>
+            <a:r>
+              <a:rPr lang="en-US" dirty="0" smtClean="0"/>
+              <a:t>Loaders: </a:t>
+            </a:r>
+            <a:r>
+              <a:rPr lang="en-US" dirty="0" err="1" smtClean="0"/>
+              <a:t>RequireJS</a:t>
+            </a:r>
+            <a:r>
+              <a:rPr lang="en-US" dirty="0" smtClean="0"/>
+              <a:t> or </a:t>
+            </a:r>
+            <a:r>
+              <a:rPr lang="en-US" dirty="0" err="1" smtClean="0"/>
+              <a:t>Browserify</a:t>
+            </a:r>
+            <a:endParaRPr lang="en-US" dirty="0" smtClean="0"/>
+          </a:p>
+          <a:p>
+            <a:r>
+              <a:rPr lang="en-US" dirty="0" smtClean="0"/>
+              <a:t>Going </a:t>
+            </a:r>
+            <a:r>
+              <a:rPr lang="en-US" dirty="0" smtClean="0"/>
+              <a:t>forward</a:t>
+            </a:r>
+          </a:p>
+          <a:p>
+            <a:pPr lvl="1"/>
+            <a:r>
+              <a:rPr lang="en-US" dirty="0" smtClean="0"/>
+              <a:t>Maven/CI integration</a:t>
+            </a:r>
+          </a:p>
+        </p:txBody>
+      </p:sp>
+    </p:spTree>
+    <p:extLst>
+      <p:ext uri="{BB962C8B-B14F-4D97-AF65-F5344CB8AC3E}">
+        <p14:creationId xmlns:p14="http://schemas.microsoft.com/office/powerpoint/2010/main" val="2337062490"/>
+      </p:ext>
+    </p:extLst>
+  </p:cSld>
+  <p:clrMapOvr>
+    <a:masterClrMapping/>
+  </p:clrMapOvr>
+  <p:timing>
+    <p:tnLst>
+      <p:par>
+        <p:cTn id="1" dur="indefinite" restart="never" nodeType="tmRoot"/>
+      </p:par>
+    </p:tnLst>
+  </p:timing>
+</p:sld>
+</file>
+
+<file path=ppt/slides/slide20.xml><?xml version="1.0" encoding="utf-8"?>
 <p:sld xmlns:a="http://schemas.openxmlformats.org/drawingml/2006/main" xmlns:r="http://schemas.openxmlformats.org/officeDocument/2006/relationships" xmlns:p="http://schemas.openxmlformats.org/presentationml/2006/main">
   <p:cSld>
     <p:spTree>
@@ -6181,7 +6521,7 @@
 </p:sld>
 </file>
 
-<file path=ppt/slides/slide2.xml><?xml version="1.0" encoding="utf-8"?>
+<file path=ppt/slides/slide3.xml><?xml version="1.0" encoding="utf-8"?>
 <p:sld xmlns:a="http://schemas.openxmlformats.org/drawingml/2006/main" xmlns:r="http://schemas.openxmlformats.org/officeDocument/2006/relationships" xmlns:p="http://schemas.openxmlformats.org/presentationml/2006/main">
   <p:cSld>
     <p:spTree>
@@ -6213,6 +6553,10 @@
           <a:bodyPr/>
           <a:lstStyle/>
           <a:p>
+            <a:r>
+              <a:rPr lang="en-US" dirty="0" smtClean="0"/>
+              <a:t>Introduction</a:t>
+            </a:r>
             <a:endParaRPr lang="en-US" dirty="0"/>
           </a:p>
         </p:txBody>
@@ -6229,118 +6573,51 @@
         </p:nvSpPr>
         <p:spPr/>
         <p:txBody>
-          <a:bodyPr>
-            <a:normAutofit fontScale="92500" lnSpcReduction="20000"/>
-          </a:bodyPr>
-          <a:lstStyle/>
-          <a:p>
-            <a:r>
-              <a:rPr lang="en-US" dirty="0" smtClean="0"/>
-              <a:t>Introduction</a:t>
-            </a:r>
-          </a:p>
-          <a:p>
-            <a:r>
-              <a:rPr lang="en-US" dirty="0" smtClean="0"/>
-              <a:t>Tools</a:t>
-            </a:r>
-          </a:p>
-          <a:p>
-            <a:pPr lvl="1"/>
-            <a:r>
-              <a:rPr lang="en-US" dirty="0" smtClean="0"/>
-              <a:t>Jasmine</a:t>
-            </a:r>
-          </a:p>
-          <a:p>
-            <a:pPr lvl="1"/>
-            <a:r>
-              <a:rPr lang="en-US" dirty="0" smtClean="0"/>
-              <a:t>Karma</a:t>
-            </a:r>
-          </a:p>
-          <a:p>
-            <a:pPr lvl="1"/>
-            <a:r>
-              <a:rPr lang="en-US" dirty="0" smtClean="0"/>
-              <a:t>Jest</a:t>
-            </a:r>
-          </a:p>
-          <a:p>
-            <a:r>
-              <a:rPr lang="en-US" dirty="0" smtClean="0"/>
-              <a:t>Demonstration</a:t>
-            </a:r>
-          </a:p>
-          <a:p>
-            <a:r>
-              <a:rPr lang="en-US" dirty="0" smtClean="0"/>
-              <a:t>More Tools</a:t>
-            </a:r>
-          </a:p>
-          <a:p>
-            <a:pPr lvl="1"/>
-            <a:r>
-              <a:rPr lang="en-US" dirty="0" smtClean="0"/>
-              <a:t>Package Management: Node/NPM</a:t>
-            </a:r>
-          </a:p>
-          <a:p>
-            <a:pPr lvl="1"/>
-            <a:r>
-              <a:rPr lang="en-US" dirty="0" smtClean="0"/>
-              <a:t>Loaders: </a:t>
+          <a:bodyPr/>
+          <a:lstStyle/>
+          <a:p>
+            <a:r>
+              <a:rPr lang="en-US" dirty="0" smtClean="0"/>
+              <a:t>Overview of different methods to test </a:t>
             </a:r>
             <a:r>
               <a:rPr lang="en-US" dirty="0" err="1" smtClean="0"/>
-              <a:t>RequireJS</a:t>
-            </a:r>
-            <a:r>
-              <a:rPr lang="en-US" dirty="0" smtClean="0"/>
-              <a:t> or </a:t>
-            </a:r>
-            <a:r>
-              <a:rPr lang="en-US" dirty="0" err="1" smtClean="0"/>
-              <a:t>Browserify</a:t>
-            </a:r>
-            <a:endParaRPr lang="en-US" dirty="0" smtClean="0"/>
-          </a:p>
-          <a:p>
-            <a:r>
-              <a:rPr lang="en-US" dirty="0" smtClean="0"/>
-              <a:t>Going forward</a:t>
-            </a:r>
-          </a:p>
-          <a:p>
-            <a:pPr lvl="1"/>
-            <a:r>
-              <a:rPr lang="en-US" dirty="0" smtClean="0"/>
-              <a:t>Maven/CI integration</a:t>
-            </a:r>
+              <a:t>javascript</a:t>
+            </a:r>
+            <a:r>
+              <a:rPr lang="en-US" dirty="0" smtClean="0"/>
+              <a:t> code</a:t>
+            </a:r>
+          </a:p>
+          <a:p>
+            <a:r>
+              <a:rPr lang="en-US" dirty="0" smtClean="0"/>
+              <a:t>Skims the surface</a:t>
+            </a:r>
+          </a:p>
+          <a:p>
+            <a:r>
+              <a:rPr lang="en-US" dirty="0" smtClean="0"/>
+              <a:t>Let us know if one of the topics would be worth another brown bag</a:t>
+            </a:r>
+            <a:endParaRPr lang="en-US" dirty="0"/>
           </a:p>
         </p:txBody>
       </p:sp>
     </p:spTree>
     <p:extLst>
       <p:ext uri="{BB962C8B-B14F-4D97-AF65-F5344CB8AC3E}">
-        <p14:creationId xmlns:p14="http://schemas.microsoft.com/office/powerpoint/2010/main" val="2337062490"/>
+        <p14:creationId xmlns:p14="http://schemas.microsoft.com/office/powerpoint/2010/main" val="454906431"/>
       </p:ext>
     </p:extLst>
   </p:cSld>
   <p:clrMapOvr>
     <a:masterClrMapping/>
   </p:clrMapOvr>
-  <p:timing>
-    <p:tnLst>
-      <p:par>
-        <p:cTn id="1" dur="indefinite" restart="never" nodeType="tmRoot"/>
-      </p:par>
-    </p:tnLst>
-  </p:timing>
 </p:sld>
 </file>
 
-<file path=ppt/slides/slide3.xml><?xml version="1.0" encoding="utf-8"?>
+<file path=ppt/slides/slide4.xml><?xml version="1.0" encoding="utf-8"?>
 <p:sld xmlns:a="http://schemas.openxmlformats.org/drawingml/2006/main" xmlns:r="http://schemas.openxmlformats.org/officeDocument/2006/relationships" xmlns:p="http://schemas.openxmlformats.org/presentationml/2006/main">
   <p:cSld>
     <p:spTree>
@@ -6429,7 +6706,7 @@
 </p:sld>
 </file>
 
-<file path=ppt/slides/slide4.xml><?xml version="1.0" encoding="utf-8"?>
+<file path=ppt/slides/slide5.xml><?xml version="1.0" encoding="utf-8"?>
 <p:sld xmlns:a="http://schemas.openxmlformats.org/drawingml/2006/main" xmlns:r="http://schemas.openxmlformats.org/officeDocument/2006/relationships" xmlns:p="http://schemas.openxmlformats.org/presentationml/2006/main">
   <p:cSld>
     <p:spTree>
@@ -6607,7 +6884,7 @@
 </p:sld>
 </file>
 
-<file path=ppt/slides/slide5.xml><?xml version="1.0" encoding="utf-8"?>
+<file path=ppt/slides/slide6.xml><?xml version="1.0" encoding="utf-8"?>
 <p:sld xmlns:a="http://schemas.openxmlformats.org/drawingml/2006/main" xmlns:r="http://schemas.openxmlformats.org/officeDocument/2006/relationships" xmlns:p="http://schemas.openxmlformats.org/presentationml/2006/main">
   <p:cSld>
     <p:spTree>
@@ -6639,7 +6916,7 @@
           <a:bodyPr/>
           <a:lstStyle/>
           <a:p>
-            <a:endParaRPr lang="en-US"/>
+            <a:endParaRPr lang="en-US" dirty="0"/>
           </a:p>
         </p:txBody>
       </p:sp>
@@ -6692,163 +6969,6 @@
 </p:sld>
 </file>
 
-<file path=ppt/slides/slide6.xml><?xml version="1.0" encoding="utf-8"?>
-<p:sld xmlns:a="http://schemas.openxmlformats.org/drawingml/2006/main" xmlns:r="http://schemas.openxmlformats.org/officeDocument/2006/relationships" xmlns:p="http://schemas.openxmlformats.org/presentationml/2006/main">
-  <p:cSld>
-    <p:spTree>
-      <p:nvGrpSpPr>
-        <p:cNvPr id="1" name=""/>
-        <p:cNvGrpSpPr/>
-        <p:nvPr/>
-      </p:nvGrpSpPr>
-      <p:grpSpPr>
-        <a:xfrm>
-          <a:off x="0" y="0"/>
-          <a:ext cx="0" cy="0"/>
-          <a:chOff x="0" y="0"/>
-          <a:chExt cx="0" cy="0"/>
-        </a:xfrm>
-      </p:grpSpPr>
-      <p:sp>
-        <p:nvSpPr>
-          <p:cNvPr id="2" name="Title 1"/>
-          <p:cNvSpPr>
-            <a:spLocks noGrp="1"/>
-          </p:cNvSpPr>
-          <p:nvPr>
-            <p:ph type="title"/>
-          </p:nvPr>
-        </p:nvSpPr>
-        <p:spPr/>
-        <p:txBody>
-          <a:bodyPr/>
-          <a:lstStyle/>
-          <a:p>
-            <a:r>
-              <a:rPr lang="en-US" dirty="0" smtClean="0"/>
-              <a:t>Jasmine</a:t>
-            </a:r>
-            <a:endParaRPr lang="en-US" dirty="0"/>
-          </a:p>
-        </p:txBody>
-      </p:sp>
-      <p:sp>
-        <p:nvSpPr>
-          <p:cNvPr id="3" name="Content Placeholder 2"/>
-          <p:cNvSpPr>
-            <a:spLocks noGrp="1"/>
-          </p:cNvSpPr>
-          <p:nvPr>
-            <p:ph idx="1"/>
-          </p:nvPr>
-        </p:nvSpPr>
-        <p:spPr/>
-        <p:txBody>
-          <a:bodyPr/>
-          <a:lstStyle/>
-          <a:p>
-            <a:r>
-              <a:rPr lang="en-US" dirty="0"/>
-              <a:t>Jasmine is an open source testing framework for JavaScript</a:t>
-            </a:r>
-            <a:r>
-              <a:rPr lang="en-US" dirty="0" smtClean="0"/>
-              <a:t>. </a:t>
-            </a:r>
-            <a:r>
-              <a:rPr lang="en-US" dirty="0"/>
-              <a:t>It aims to run on any JavaScript-enabled platform, to not intrude on the application nor the IDE, and to have easy-to-read syntax. It is heavily influenced by other unit testing frameworks, such as </a:t>
-            </a:r>
-            <a:r>
-              <a:rPr lang="en-US" dirty="0" err="1"/>
-              <a:t>ScrewUnit</a:t>
-            </a:r>
-            <a:r>
-              <a:rPr lang="en-US" dirty="0"/>
-              <a:t>, </a:t>
-            </a:r>
-            <a:r>
-              <a:rPr lang="en-US" dirty="0" err="1"/>
-              <a:t>JSSpec</a:t>
-            </a:r>
-            <a:r>
-              <a:rPr lang="en-US" dirty="0"/>
-              <a:t>, </a:t>
-            </a:r>
-            <a:r>
-              <a:rPr lang="en-US" dirty="0" err="1"/>
-              <a:t>JSpec</a:t>
-            </a:r>
-            <a:r>
-              <a:rPr lang="en-US" dirty="0"/>
-              <a:t>, and </a:t>
-            </a:r>
-            <a:r>
-              <a:rPr lang="en-US" dirty="0" err="1"/>
-              <a:t>RSpec</a:t>
-            </a:r>
-            <a:r>
-              <a:rPr lang="en-US" dirty="0" smtClean="0"/>
-              <a:t>.</a:t>
-            </a:r>
-          </a:p>
-          <a:p>
-            <a:endParaRPr lang="en-US" dirty="0"/>
-          </a:p>
-        </p:txBody>
-      </p:sp>
-      <p:sp>
-        <p:nvSpPr>
-          <p:cNvPr id="4" name="TextBox 3"/>
-          <p:cNvSpPr txBox="1"/>
-          <p:nvPr/>
-        </p:nvSpPr>
-        <p:spPr>
-          <a:xfrm>
-            <a:off x="3810000" y="6038076"/>
-            <a:ext cx="4881465" cy="276999"/>
-          </a:xfrm>
-          <a:prstGeom prst="rect">
-            <a:avLst/>
-          </a:prstGeom>
-          <a:noFill/>
-        </p:spPr>
-        <p:txBody>
-          <a:bodyPr wrap="none" rtlCol="0">
-            <a:spAutoFit/>
-          </a:bodyPr>
-          <a:lstStyle/>
-          <a:p>
-            <a:r>
-              <a:rPr lang="en-US" sz="1200" dirty="0" smtClean="0">
-                <a:hlinkClick r:id="rId2"/>
-              </a:rPr>
-              <a:t>https://en.wikipedia.org/wiki/Jasmine_%28JavaScript_framework%29</a:t>
-            </a:r>
-            <a:endParaRPr lang="en-US" sz="1200" dirty="0"/>
-          </a:p>
-        </p:txBody>
-      </p:sp>
-    </p:spTree>
-    <p:extLst>
-      <p:ext uri="{BB962C8B-B14F-4D97-AF65-F5344CB8AC3E}">
-        <p14:creationId xmlns:p14="http://schemas.microsoft.com/office/powerpoint/2010/main" val="1662494579"/>
-      </p:ext>
-    </p:extLst>
-  </p:cSld>
-  <p:clrMapOvr>
-    <a:masterClrMapping/>
-  </p:clrMapOvr>
-  <p:timing>
-    <p:tnLst>
-      <p:par>
-        <p:cTn id="1" dur="indefinite" restart="never" nodeType="tmRoot"/>
-      </p:par>
-    </p:tnLst>
-  </p:timing>
-</p:sld>
-</file>
-
 <file path=ppt/slides/slide7.xml><?xml version="1.0" encoding="utf-8"?>
 <p:sld xmlns:a="http://schemas.openxmlformats.org/drawingml/2006/main" xmlns:r="http://schemas.openxmlformats.org/officeDocument/2006/relationships" xmlns:p="http://schemas.openxmlformats.org/presentationml/2006/main">
   <p:cSld>
@@ -6905,153 +7025,112 @@
           <a:lstStyle/>
           <a:p>
             <a:r>
-              <a:rPr lang="en-US" dirty="0" smtClean="0"/>
-              <a:t>Example:</a:t>
-            </a:r>
-          </a:p>
-          <a:p>
+              <a:rPr lang="en-US" dirty="0">
+                <a:hlinkClick r:id="rId2"/>
+              </a:rPr>
+              <a:t>Jasmine</a:t>
+            </a:r>
+            <a:r>
+              <a:rPr lang="en-US" dirty="0"/>
+              <a:t> is an open source testing framework for JavaScript</a:t>
+            </a:r>
+            <a:r>
+              <a:rPr lang="en-US" dirty="0" smtClean="0"/>
+              <a:t>. </a:t>
+            </a:r>
+            <a:r>
+              <a:rPr lang="en-US" dirty="0"/>
+              <a:t>It aims to run on any JavaScript-enabled platform, to not intrude on the application nor the IDE, and to have easy-to-read syntax. It is heavily influenced by other unit testing frameworks, such as </a:t>
+            </a:r>
+            <a:r>
+              <a:rPr lang="en-US" dirty="0" err="1"/>
+              <a:t>ScrewUnit</a:t>
+            </a:r>
+            <a:r>
+              <a:rPr lang="en-US" dirty="0"/>
+              <a:t>, </a:t>
+            </a:r>
+            <a:r>
+              <a:rPr lang="en-US" dirty="0" err="1"/>
+              <a:t>JSSpec</a:t>
+            </a:r>
+            <a:r>
+              <a:rPr lang="en-US" dirty="0"/>
+              <a:t>, </a:t>
+            </a:r>
+            <a:r>
+              <a:rPr lang="en-US" dirty="0" err="1"/>
+              <a:t>JSpec</a:t>
+            </a:r>
+            <a:r>
+              <a:rPr lang="en-US" dirty="0"/>
+              <a:t>, and </a:t>
+            </a:r>
+            <a:r>
+              <a:rPr lang="en-US" dirty="0" err="1"/>
+              <a:t>RSpec</a:t>
+            </a:r>
+            <a:r>
+              <a:rPr lang="en-US" dirty="0" smtClean="0"/>
+              <a:t>.</a:t>
+            </a:r>
+          </a:p>
+          <a:p>
+            <a:r>
+              <a:rPr lang="en-US" dirty="0" smtClean="0"/>
+              <a:t>De facto standard for </a:t>
+            </a:r>
+            <a:r>
+              <a:rPr lang="en-US" dirty="0" err="1" smtClean="0"/>
+              <a:t>javascript</a:t>
+            </a:r>
+            <a:r>
+              <a:rPr lang="en-US" dirty="0" smtClean="0"/>
+              <a:t> testing</a:t>
+            </a:r>
             <a:endParaRPr lang="en-US" dirty="0" smtClean="0"/>
           </a:p>
           <a:p>
-            <a:pPr marL="36576" indent="0">
-              <a:buNone/>
-            </a:pPr>
-            <a:r>
-              <a:rPr lang="en-US" sz="1800" dirty="0">
-                <a:latin typeface="Consolas" panose="020B0609020204030204" pitchFamily="49" charset="0"/>
-                <a:cs typeface="Consolas" panose="020B0609020204030204" pitchFamily="49" charset="0"/>
-              </a:rPr>
-              <a:t>describe('Hello world', function() </a:t>
-            </a:r>
-            <a:r>
-              <a:rPr lang="en-US" sz="1800" dirty="0" smtClean="0">
-                <a:latin typeface="Consolas" panose="020B0609020204030204" pitchFamily="49" charset="0"/>
-                <a:cs typeface="Consolas" panose="020B0609020204030204" pitchFamily="49" charset="0"/>
-              </a:rPr>
-              <a:t>{</a:t>
-            </a:r>
-          </a:p>
-          <a:p>
-            <a:pPr marL="36576" indent="0">
-              <a:buNone/>
-            </a:pPr>
-            <a:r>
-              <a:rPr lang="en-US" sz="1800" dirty="0">
-                <a:latin typeface="Consolas" panose="020B0609020204030204" pitchFamily="49" charset="0"/>
-                <a:cs typeface="Consolas" panose="020B0609020204030204" pitchFamily="49" charset="0"/>
-              </a:rPr>
-              <a:t> </a:t>
-            </a:r>
-            <a:r>
-              <a:rPr lang="en-US" sz="1800" dirty="0" smtClean="0">
-                <a:latin typeface="Consolas" panose="020B0609020204030204" pitchFamily="49" charset="0"/>
-                <a:cs typeface="Consolas" panose="020B0609020204030204" pitchFamily="49" charset="0"/>
-              </a:rPr>
-              <a:t>  </a:t>
-            </a:r>
-            <a:r>
-              <a:rPr lang="en-US" sz="1800" dirty="0">
-                <a:latin typeface="Consolas" panose="020B0609020204030204" pitchFamily="49" charset="0"/>
-                <a:cs typeface="Consolas" panose="020B0609020204030204" pitchFamily="49" charset="0"/>
-              </a:rPr>
-              <a:t>it('says hello', function() </a:t>
-            </a:r>
-            <a:r>
-              <a:rPr lang="en-US" sz="1800" dirty="0" smtClean="0">
-                <a:latin typeface="Consolas" panose="020B0609020204030204" pitchFamily="49" charset="0"/>
-                <a:cs typeface="Consolas" panose="020B0609020204030204" pitchFamily="49" charset="0"/>
-              </a:rPr>
-              <a:t>{</a:t>
-            </a:r>
-          </a:p>
-          <a:p>
-            <a:pPr marL="36576" indent="0">
-              <a:buNone/>
-            </a:pPr>
-            <a:r>
-              <a:rPr lang="en-US" sz="1800" dirty="0">
-                <a:latin typeface="Consolas" panose="020B0609020204030204" pitchFamily="49" charset="0"/>
-                <a:cs typeface="Consolas" panose="020B0609020204030204" pitchFamily="49" charset="0"/>
-              </a:rPr>
-              <a:t> </a:t>
-            </a:r>
-            <a:r>
-              <a:rPr lang="en-US" sz="1800" dirty="0" smtClean="0">
-                <a:latin typeface="Consolas" panose="020B0609020204030204" pitchFamily="49" charset="0"/>
-                <a:cs typeface="Consolas" panose="020B0609020204030204" pitchFamily="49" charset="0"/>
-              </a:rPr>
-              <a:t>     expect(</a:t>
-            </a:r>
-            <a:r>
-              <a:rPr lang="en-US" sz="1800" dirty="0" err="1" smtClean="0">
-                <a:latin typeface="Consolas" panose="020B0609020204030204" pitchFamily="49" charset="0"/>
-                <a:cs typeface="Consolas" panose="020B0609020204030204" pitchFamily="49" charset="0"/>
-              </a:rPr>
-              <a:t>helloWorld</a:t>
-            </a:r>
-            <a:r>
-              <a:rPr lang="en-US" sz="1800" dirty="0">
-                <a:latin typeface="Consolas" panose="020B0609020204030204" pitchFamily="49" charset="0"/>
-                <a:cs typeface="Consolas" panose="020B0609020204030204" pitchFamily="49" charset="0"/>
-              </a:rPr>
-              <a:t>()).</a:t>
-            </a:r>
-            <a:r>
-              <a:rPr lang="en-US" sz="1800" dirty="0" err="1">
-                <a:latin typeface="Consolas" panose="020B0609020204030204" pitchFamily="49" charset="0"/>
-                <a:cs typeface="Consolas" panose="020B0609020204030204" pitchFamily="49" charset="0"/>
-              </a:rPr>
-              <a:t>toEqual</a:t>
-            </a:r>
-            <a:r>
-              <a:rPr lang="en-US" sz="1800" dirty="0">
-                <a:latin typeface="Consolas" panose="020B0609020204030204" pitchFamily="49" charset="0"/>
-                <a:cs typeface="Consolas" panose="020B0609020204030204" pitchFamily="49" charset="0"/>
-              </a:rPr>
-              <a:t>("Hello world</a:t>
-            </a:r>
-            <a:r>
-              <a:rPr lang="en-US" sz="1800" dirty="0" smtClean="0">
-                <a:latin typeface="Consolas" panose="020B0609020204030204" pitchFamily="49" charset="0"/>
-                <a:cs typeface="Consolas" panose="020B0609020204030204" pitchFamily="49" charset="0"/>
-              </a:rPr>
-              <a:t>!");</a:t>
-            </a:r>
-          </a:p>
-          <a:p>
-            <a:pPr marL="36576" indent="0">
-              <a:buNone/>
-            </a:pPr>
-            <a:r>
-              <a:rPr lang="en-US" sz="1800" dirty="0" smtClean="0">
-                <a:latin typeface="Consolas" panose="020B0609020204030204" pitchFamily="49" charset="0"/>
-                <a:cs typeface="Consolas" panose="020B0609020204030204" pitchFamily="49" charset="0"/>
-              </a:rPr>
-              <a:t>   });</a:t>
-            </a:r>
-          </a:p>
-          <a:p>
-            <a:pPr marL="36576" indent="0">
-              <a:buNone/>
-            </a:pPr>
-            <a:r>
-              <a:rPr lang="en-US" sz="1800" dirty="0" smtClean="0">
-                <a:latin typeface="Consolas" panose="020B0609020204030204" pitchFamily="49" charset="0"/>
-                <a:cs typeface="Consolas" panose="020B0609020204030204" pitchFamily="49" charset="0"/>
-              </a:rPr>
-              <a:t>});</a:t>
-            </a:r>
-            <a:endParaRPr lang="en-US" sz="1800" dirty="0">
-              <a:latin typeface="Consolas" panose="020B0609020204030204" pitchFamily="49" charset="0"/>
-              <a:cs typeface="Consolas" panose="020B0609020204030204" pitchFamily="49" charset="0"/>
-            </a:endParaRPr>
+            <a:endParaRPr lang="en-US" dirty="0"/>
+          </a:p>
+        </p:txBody>
+      </p:sp>
+      <p:sp>
+        <p:nvSpPr>
+          <p:cNvPr id="4" name="TextBox 3"/>
+          <p:cNvSpPr txBox="1"/>
+          <p:nvPr/>
+        </p:nvSpPr>
+        <p:spPr>
+          <a:xfrm>
+            <a:off x="3810000" y="6038076"/>
+            <a:ext cx="4881465" cy="276999"/>
+          </a:xfrm>
+          <a:prstGeom prst="rect">
+            <a:avLst/>
+          </a:prstGeom>
+          <a:noFill/>
+        </p:spPr>
+        <p:txBody>
+          <a:bodyPr wrap="none" rtlCol="0">
+            <a:spAutoFit/>
+          </a:bodyPr>
+          <a:lstStyle/>
+          <a:p>
+            <a:r>
+              <a:rPr lang="en-US" sz="1200" dirty="0" smtClean="0">
+                <a:hlinkClick r:id="rId3"/>
+              </a:rPr>
+              <a:t>https://en.wikipedia.org/wiki/Jasmine_%28JavaScript_framework%29</a:t>
+            </a:r>
+            <a:endParaRPr lang="en-US" sz="1200" dirty="0"/>
           </a:p>
         </p:txBody>
       </p:sp>
     </p:spTree>
     <p:extLst>
       <p:ext uri="{BB962C8B-B14F-4D97-AF65-F5344CB8AC3E}">
-        <p14:creationId xmlns:p14="http://schemas.microsoft.com/office/powerpoint/2010/main" val="4064705731"/>
+        <p14:creationId xmlns:p14="http://schemas.microsoft.com/office/powerpoint/2010/main" val="1662494579"/>
       </p:ext>
     </p:extLst>
   </p:cSld>
@@ -7100,43 +7179,248 @@
           <a:bodyPr/>
           <a:lstStyle/>
           <a:p>
-            <a:endParaRPr lang="en-US"/>
-          </a:p>
-        </p:txBody>
-      </p:sp>
-      <p:pic>
-        <p:nvPicPr>
-          <p:cNvPr id="4" name="Content Placeholder 3"/>
-          <p:cNvPicPr>
-            <a:picLocks noGrp="1" noChangeAspect="1"/>
-          </p:cNvPicPr>
+            <a:r>
+              <a:rPr lang="en-US" dirty="0" smtClean="0"/>
+              <a:t>Jasmine</a:t>
+            </a:r>
+            <a:endParaRPr lang="en-US" dirty="0"/>
+          </a:p>
+        </p:txBody>
+      </p:sp>
+      <p:sp>
+        <p:nvSpPr>
+          <p:cNvPr id="3" name="Content Placeholder 2"/>
+          <p:cNvSpPr>
+            <a:spLocks noGrp="1"/>
+          </p:cNvSpPr>
           <p:nvPr>
             <p:ph idx="1"/>
           </p:nvPr>
-        </p:nvPicPr>
-        <p:blipFill>
-          <a:blip r:embed="rId2">
-            <a:extLst>
-              <a:ext uri="{28A0092B-C50C-407E-A947-70E740481C1C}">
-                <a14:useLocalDpi xmlns:a14="http://schemas.microsoft.com/office/drawing/2010/main" val="0"/>
-              </a:ext>
-            </a:extLst>
-          </a:blip>
-          <a:stretch>
-            <a:fillRect/>
-          </a:stretch>
-        </p:blipFill>
-        <p:spPr>
-          <a:xfrm>
-            <a:off x="1214437" y="2415381"/>
-            <a:ext cx="5953125" cy="2895600"/>
-          </a:xfrm>
-        </p:spPr>
-      </p:pic>
+        </p:nvSpPr>
+        <p:spPr/>
+        <p:txBody>
+          <a:bodyPr>
+            <a:normAutofit/>
+          </a:bodyPr>
+          <a:lstStyle/>
+          <a:p>
+            <a:r>
+              <a:rPr lang="en-US" dirty="0" smtClean="0"/>
+              <a:t>Example:</a:t>
+            </a:r>
+          </a:p>
+          <a:p>
+            <a:endParaRPr lang="en-US" dirty="0" smtClean="0"/>
+          </a:p>
+          <a:p>
+            <a:pPr marL="36576" indent="0">
+              <a:buNone/>
+            </a:pPr>
+            <a:r>
+              <a:rPr lang="en-US" sz="1800" dirty="0">
+                <a:latin typeface="Consolas" panose="020B0609020204030204" pitchFamily="49" charset="0"/>
+                <a:cs typeface="Consolas" panose="020B0609020204030204" pitchFamily="49" charset="0"/>
+              </a:rPr>
+              <a:t>describe('Hello world', function() </a:t>
+            </a:r>
+            <a:r>
+              <a:rPr lang="en-US" sz="1800" dirty="0" smtClean="0">
+                <a:latin typeface="Consolas" panose="020B0609020204030204" pitchFamily="49" charset="0"/>
+                <a:cs typeface="Consolas" panose="020B0609020204030204" pitchFamily="49" charset="0"/>
+              </a:rPr>
+              <a:t>{</a:t>
+            </a:r>
+          </a:p>
+          <a:p>
+            <a:pPr marL="36576" indent="0">
+              <a:buNone/>
+            </a:pPr>
+            <a:r>
+              <a:rPr lang="en-US" sz="1800" dirty="0">
+                <a:latin typeface="Consolas" panose="020B0609020204030204" pitchFamily="49" charset="0"/>
+                <a:cs typeface="Consolas" panose="020B0609020204030204" pitchFamily="49" charset="0"/>
+              </a:rPr>
+              <a:t> </a:t>
+            </a:r>
+            <a:r>
+              <a:rPr lang="en-US" sz="1800" dirty="0" smtClean="0">
+                <a:latin typeface="Consolas" panose="020B0609020204030204" pitchFamily="49" charset="0"/>
+                <a:cs typeface="Consolas" panose="020B0609020204030204" pitchFamily="49" charset="0"/>
+              </a:rPr>
+              <a:t>  </a:t>
+            </a:r>
+            <a:r>
+              <a:rPr lang="en-US" sz="1800" dirty="0">
+                <a:latin typeface="Consolas" panose="020B0609020204030204" pitchFamily="49" charset="0"/>
+                <a:cs typeface="Consolas" panose="020B0609020204030204" pitchFamily="49" charset="0"/>
+              </a:rPr>
+              <a:t>it('says hello', function() </a:t>
+            </a:r>
+            <a:r>
+              <a:rPr lang="en-US" sz="1800" dirty="0" smtClean="0">
+                <a:latin typeface="Consolas" panose="020B0609020204030204" pitchFamily="49" charset="0"/>
+                <a:cs typeface="Consolas" panose="020B0609020204030204" pitchFamily="49" charset="0"/>
+              </a:rPr>
+              <a:t>{</a:t>
+            </a:r>
+          </a:p>
+          <a:p>
+            <a:pPr marL="36576" indent="0">
+              <a:buNone/>
+            </a:pPr>
+            <a:r>
+              <a:rPr lang="en-US" sz="1800" dirty="0">
+                <a:latin typeface="Consolas" panose="020B0609020204030204" pitchFamily="49" charset="0"/>
+                <a:cs typeface="Consolas" panose="020B0609020204030204" pitchFamily="49" charset="0"/>
+              </a:rPr>
+              <a:t> </a:t>
+            </a:r>
+            <a:r>
+              <a:rPr lang="en-US" sz="1800" dirty="0" smtClean="0">
+                <a:latin typeface="Consolas" panose="020B0609020204030204" pitchFamily="49" charset="0"/>
+                <a:cs typeface="Consolas" panose="020B0609020204030204" pitchFamily="49" charset="0"/>
+              </a:rPr>
+              <a:t>     expect(</a:t>
+            </a:r>
+            <a:r>
+              <a:rPr lang="en-US" sz="1800" dirty="0" err="1" smtClean="0">
+                <a:latin typeface="Consolas" panose="020B0609020204030204" pitchFamily="49" charset="0"/>
+                <a:cs typeface="Consolas" panose="020B0609020204030204" pitchFamily="49" charset="0"/>
+              </a:rPr>
+              <a:t>helloWorld</a:t>
+            </a:r>
+            <a:r>
+              <a:rPr lang="en-US" sz="1800" dirty="0">
+                <a:latin typeface="Consolas" panose="020B0609020204030204" pitchFamily="49" charset="0"/>
+                <a:cs typeface="Consolas" panose="020B0609020204030204" pitchFamily="49" charset="0"/>
+              </a:rPr>
+              <a:t>()).</a:t>
+            </a:r>
+            <a:r>
+              <a:rPr lang="en-US" sz="1800" dirty="0" err="1">
+                <a:latin typeface="Consolas" panose="020B0609020204030204" pitchFamily="49" charset="0"/>
+                <a:cs typeface="Consolas" panose="020B0609020204030204" pitchFamily="49" charset="0"/>
+              </a:rPr>
+              <a:t>toEqual</a:t>
+            </a:r>
+            <a:r>
+              <a:rPr lang="en-US" sz="1800" dirty="0">
+                <a:latin typeface="Consolas" panose="020B0609020204030204" pitchFamily="49" charset="0"/>
+                <a:cs typeface="Consolas" panose="020B0609020204030204" pitchFamily="49" charset="0"/>
+              </a:rPr>
+              <a:t>("Hello world</a:t>
+            </a:r>
+            <a:r>
+              <a:rPr lang="en-US" sz="1800" dirty="0" smtClean="0">
+                <a:latin typeface="Consolas" panose="020B0609020204030204" pitchFamily="49" charset="0"/>
+                <a:cs typeface="Consolas" panose="020B0609020204030204" pitchFamily="49" charset="0"/>
+              </a:rPr>
+              <a:t>!");</a:t>
+            </a:r>
+          </a:p>
+          <a:p>
+            <a:pPr marL="36576" indent="0">
+              <a:buNone/>
+            </a:pPr>
+            <a:r>
+              <a:rPr lang="en-US" sz="1800" dirty="0" smtClean="0">
+                <a:latin typeface="Consolas" panose="020B0609020204030204" pitchFamily="49" charset="0"/>
+                <a:cs typeface="Consolas" panose="020B0609020204030204" pitchFamily="49" charset="0"/>
+              </a:rPr>
+              <a:t>   });</a:t>
+            </a:r>
+          </a:p>
+          <a:p>
+            <a:pPr marL="36576" indent="0">
+              <a:buNone/>
+            </a:pPr>
+            <a:r>
+              <a:rPr lang="en-US" sz="1800" dirty="0" smtClean="0">
+                <a:latin typeface="Consolas" panose="020B0609020204030204" pitchFamily="49" charset="0"/>
+                <a:cs typeface="Consolas" panose="020B0609020204030204" pitchFamily="49" charset="0"/>
+              </a:rPr>
+              <a:t>});</a:t>
+            </a:r>
+          </a:p>
+          <a:p>
+            <a:pPr marL="36576" indent="0">
+              <a:buNone/>
+            </a:pPr>
+            <a:endParaRPr lang="en-US" sz="1800" dirty="0">
+              <a:latin typeface="Consolas" panose="020B0609020204030204" pitchFamily="49" charset="0"/>
+              <a:cs typeface="Consolas" panose="020B0609020204030204" pitchFamily="49" charset="0"/>
+            </a:endParaRPr>
+          </a:p>
+          <a:p>
+            <a:pPr lvl="0">
+              <a:buClr>
+                <a:srgbClr val="6EA0B0"/>
+              </a:buClr>
+            </a:pPr>
+            <a:r>
+              <a:rPr lang="en-US" sz="2400" dirty="0" smtClean="0">
+                <a:solidFill>
+                  <a:prstClr val="white"/>
+                </a:solidFill>
+              </a:rPr>
+              <a:t>Missing concept of spies </a:t>
+            </a:r>
+            <a:r>
+              <a:rPr lang="en-US" sz="2400" i="1" dirty="0" smtClean="0">
+                <a:solidFill>
+                  <a:prstClr val="white"/>
+                </a:solidFill>
+              </a:rPr>
+              <a:t>(like mocks – </a:t>
+            </a:r>
+            <a:r>
+              <a:rPr lang="en-US" sz="2400" i="1" dirty="0" err="1" smtClean="0">
+                <a:solidFill>
+                  <a:prstClr val="white"/>
+                </a:solidFill>
+              </a:rPr>
+              <a:t>kinda</a:t>
+            </a:r>
+            <a:r>
+              <a:rPr lang="en-US" sz="2400" i="1" dirty="0" smtClean="0">
+                <a:solidFill>
+                  <a:prstClr val="white"/>
+                </a:solidFill>
+              </a:rPr>
+              <a:t>)</a:t>
+            </a:r>
+          </a:p>
+          <a:p>
+            <a:pPr lvl="1">
+              <a:buClr>
+                <a:srgbClr val="6EA0B0"/>
+              </a:buClr>
+            </a:pPr>
+            <a:r>
+              <a:rPr lang="en-US" sz="2000" dirty="0"/>
+              <a:t>A spy can stub any function and tracks calls to it and all arguments.</a:t>
+            </a:r>
+            <a:endParaRPr lang="en-US" sz="2000" dirty="0" smtClean="0">
+              <a:solidFill>
+                <a:prstClr val="white"/>
+              </a:solidFill>
+            </a:endParaRPr>
+          </a:p>
+          <a:p>
+            <a:pPr marL="36576" indent="0">
+              <a:buNone/>
+            </a:pPr>
+            <a:endParaRPr lang="en-US" sz="1800" dirty="0">
+              <a:latin typeface="Consolas" panose="020B0609020204030204" pitchFamily="49" charset="0"/>
+              <a:cs typeface="Consolas" panose="020B0609020204030204" pitchFamily="49" charset="0"/>
+            </a:endParaRPr>
+          </a:p>
+        </p:txBody>
+      </p:sp>
     </p:spTree>
     <p:extLst>
       <p:ext uri="{BB962C8B-B14F-4D97-AF65-F5344CB8AC3E}">
-        <p14:creationId xmlns:p14="http://schemas.microsoft.com/office/powerpoint/2010/main" val="160297541"/>
+        <p14:creationId xmlns:p14="http://schemas.microsoft.com/office/powerpoint/2010/main" val="4064705731"/>
       </p:ext>
     </p:extLst>
   </p:cSld>
@@ -7185,40 +7469,43 @@
           <a:bodyPr/>
           <a:lstStyle/>
           <a:p>
-            <a:r>
-              <a:rPr lang="en-US" dirty="0" smtClean="0"/>
-              <a:t>Karma</a:t>
-            </a:r>
-            <a:endParaRPr lang="en-US" dirty="0"/>
-          </a:p>
-        </p:txBody>
-      </p:sp>
-      <p:sp>
-        <p:nvSpPr>
-          <p:cNvPr id="3" name="Content Placeholder 2"/>
-          <p:cNvSpPr>
-            <a:spLocks noGrp="1"/>
-          </p:cNvSpPr>
+            <a:endParaRPr lang="en-US"/>
+          </a:p>
+        </p:txBody>
+      </p:sp>
+      <p:pic>
+        <p:nvPicPr>
+          <p:cNvPr id="4" name="Content Placeholder 3"/>
+          <p:cNvPicPr>
+            <a:picLocks noGrp="1" noChangeAspect="1"/>
+          </p:cNvPicPr>
           <p:nvPr>
             <p:ph idx="1"/>
           </p:nvPr>
-        </p:nvSpPr>
-        <p:spPr/>
-        <p:txBody>
-          <a:bodyPr/>
-          <a:lstStyle/>
-          <a:p>
-            <a:r>
-              <a:rPr lang="en-US" dirty="0"/>
-              <a:t>Karma is essentially a tool which spawns a web server that executes source code against test code for each of the browsers connected. The results for each test against each browser are examined and displayed via the command line to the developer such that they can see which browsers and tests passed or failed.</a:t>
-            </a:r>
-          </a:p>
-        </p:txBody>
-      </p:sp>
+        </p:nvPicPr>
+        <p:blipFill>
+          <a:blip r:embed="rId2">
+            <a:extLst>
+              <a:ext uri="{28A0092B-C50C-407E-A947-70E740481C1C}">
+                <a14:useLocalDpi xmlns:a14="http://schemas.microsoft.com/office/drawing/2010/main" val="0"/>
+              </a:ext>
+            </a:extLst>
+          </a:blip>
+          <a:stretch>
+            <a:fillRect/>
+          </a:stretch>
+        </p:blipFill>
+        <p:spPr>
+          <a:xfrm>
+            <a:off x="1214437" y="2415381"/>
+            <a:ext cx="5953125" cy="2895600"/>
+          </a:xfrm>
+        </p:spPr>
+      </p:pic>
     </p:spTree>
     <p:extLst>
       <p:ext uri="{BB962C8B-B14F-4D97-AF65-F5344CB8AC3E}">
-        <p14:creationId xmlns:p14="http://schemas.microsoft.com/office/powerpoint/2010/main" val="210717048"/>
+        <p14:creationId xmlns:p14="http://schemas.microsoft.com/office/powerpoint/2010/main" val="160297541"/>
       </p:ext>
     </p:extLst>
   </p:cSld>

</xml_diff>